<commit_message>
using more packages for visualization
</commit_message>
<xml_diff>
--- a/introR/Introduction to R.pptx
+++ b/introR/Introduction to R.pptx
@@ -27,13 +27,13 @@
     <p:sldId id="279" r:id="rId18"/>
     <p:sldId id="288" r:id="rId19"/>
     <p:sldId id="287" r:id="rId20"/>
-    <p:sldId id="271" r:id="rId21"/>
-    <p:sldId id="289" r:id="rId22"/>
-    <p:sldId id="290" r:id="rId23"/>
-    <p:sldId id="267" r:id="rId24"/>
-    <p:sldId id="291" r:id="rId25"/>
-    <p:sldId id="293" r:id="rId26"/>
-    <p:sldId id="294" r:id="rId27"/>
+    <p:sldId id="267" r:id="rId21"/>
+    <p:sldId id="291" r:id="rId22"/>
+    <p:sldId id="293" r:id="rId23"/>
+    <p:sldId id="294" r:id="rId24"/>
+    <p:sldId id="301" r:id="rId25"/>
+    <p:sldId id="302" r:id="rId26"/>
+    <p:sldId id="303" r:id="rId27"/>
     <p:sldId id="272" r:id="rId28"/>
     <p:sldId id="295" r:id="rId29"/>
     <p:sldId id="296" r:id="rId30"/>
@@ -6078,8 +6078,19 @@
           <a:lstStyle/>
           <a:p>
             <a:r>
+              <a:rPr lang="en-US" dirty="0"/>
+              <a:t>READING </a:t>
+            </a:r>
+            <a:r>
               <a:rPr lang="en-US" dirty="0" smtClean="0"/>
-              <a:t>DATA MANIPULATION</a:t>
+              <a:t>AND </a:t>
+            </a:r>
+            <a:br>
+              <a:rPr lang="en-US" dirty="0" smtClean="0"/>
+            </a:br>
+            <a:r>
+              <a:rPr lang="en-US" dirty="0" smtClean="0"/>
+              <a:t>WRITING DATA</a:t>
             </a:r>
             <a:endParaRPr lang="en-US" dirty="0"/>
           </a:p>
@@ -6107,18 +6118,9 @@
           <a:lstStyle/>
           <a:p>
             <a:r>
-              <a:rPr lang="en-US" dirty="0" smtClean="0"/>
-              <a:t>Subsetting</a:t>
-            </a:r>
-            <a:r>
               <a:rPr lang="en-US" dirty="0"/>
-              <a:t> </a:t>
-            </a:r>
-            <a:r>
-              <a:rPr lang="en-US" dirty="0" smtClean="0"/>
-              <a:t>and filtering</a:t>
-            </a:r>
-            <a:endParaRPr lang="en-US" dirty="0"/>
+              <a:t>Excel, Comma-Separated and Tab-Separated Values, and more!</a:t>
+            </a:r>
           </a:p>
         </p:txBody>
       </p:sp>
@@ -6240,7 +6242,7 @@
     </p:spTree>
     <p:extLst>
       <p:ext uri="{BB962C8B-B14F-4D97-AF65-F5344CB8AC3E}">
-        <p14:creationId xmlns:p14="http://schemas.microsoft.com/office/powerpoint/2010/main" val="235569832"/>
+        <p14:creationId xmlns:p14="http://schemas.microsoft.com/office/powerpoint/2010/main" val="2581962988"/>
       </p:ext>
     </p:extLst>
   </p:cSld>
@@ -6284,7 +6286,7 @@
           <a:p>
             <a:r>
               <a:rPr lang="en-US" dirty="0" smtClean="0"/>
-              <a:t>SUBSETTING</a:t>
+              <a:t>COMMON FILE FORMATS</a:t>
             </a:r>
             <a:endParaRPr lang="en-US" dirty="0"/>
           </a:p>
@@ -6307,13 +6309,78 @@
           <a:p>
             <a:r>
               <a:rPr lang="en-US" dirty="0" smtClean="0"/>
-              <a:t>By Row:</a:t>
-            </a:r>
-          </a:p>
-          <a:p>
+              <a:t>Comma/Tab Separated Values: (.csv, .</a:t>
+            </a:r>
+            <a:r>
+              <a:rPr lang="en-US" dirty="0" err="1" smtClean="0"/>
+              <a:t>tsv</a:t>
+            </a:r>
             <a:r>
               <a:rPr lang="en-US" dirty="0" smtClean="0"/>
-              <a:t>By Column:</a:t>
+              <a:t>)</a:t>
+            </a:r>
+          </a:p>
+          <a:p>
+            <a:pPr lvl="1"/>
+            <a:r>
+              <a:rPr lang="en-US" dirty="0" smtClean="0"/>
+              <a:t>Example</a:t>
+            </a:r>
+          </a:p>
+          <a:p>
+            <a:r>
+              <a:rPr lang="en-US" dirty="0" smtClean="0"/>
+              <a:t>Excel files (.</a:t>
+            </a:r>
+            <a:r>
+              <a:rPr lang="en-US" dirty="0" err="1" smtClean="0"/>
+              <a:t>xlsx</a:t>
+            </a:r>
+            <a:r>
+              <a:rPr lang="en-US" dirty="0" smtClean="0"/>
+              <a:t>, .</a:t>
+            </a:r>
+            <a:r>
+              <a:rPr lang="en-US" dirty="0" err="1" smtClean="0"/>
+              <a:t>xls</a:t>
+            </a:r>
+            <a:r>
+              <a:rPr lang="en-US" dirty="0" smtClean="0"/>
+              <a:t>*)</a:t>
+            </a:r>
+          </a:p>
+          <a:p>
+            <a:r>
+              <a:rPr lang="en-US" dirty="0" smtClean="0"/>
+              <a:t>JSON (.</a:t>
+            </a:r>
+            <a:r>
+              <a:rPr lang="en-US" dirty="0" err="1" smtClean="0"/>
+              <a:t>json</a:t>
+            </a:r>
+            <a:r>
+              <a:rPr lang="en-US" dirty="0" smtClean="0"/>
+              <a:t>)</a:t>
+            </a:r>
+          </a:p>
+          <a:p>
+            <a:pPr lvl="1"/>
+            <a:r>
+              <a:rPr lang="en-US" dirty="0" smtClean="0"/>
+              <a:t>Example</a:t>
+            </a:r>
+          </a:p>
+          <a:p>
+            <a:r>
+              <a:rPr lang="en-US" dirty="0" smtClean="0"/>
+              <a:t>XML (.xml)</a:t>
+            </a:r>
+          </a:p>
+          <a:p>
+            <a:pPr lvl="1"/>
+            <a:r>
+              <a:rPr lang="en-US" dirty="0" smtClean="0"/>
+              <a:t>Example</a:t>
             </a:r>
             <a:endParaRPr lang="en-US" dirty="0"/>
           </a:p>
@@ -6419,7 +6486,7 @@
     </p:spTree>
     <p:extLst>
       <p:ext uri="{BB962C8B-B14F-4D97-AF65-F5344CB8AC3E}">
-        <p14:creationId xmlns:p14="http://schemas.microsoft.com/office/powerpoint/2010/main" val="2279848204"/>
+        <p14:creationId xmlns:p14="http://schemas.microsoft.com/office/powerpoint/2010/main" val="3674866452"/>
       </p:ext>
     </p:extLst>
   </p:cSld>
@@ -6463,7 +6530,7 @@
           <a:p>
             <a:r>
               <a:rPr lang="en-US" dirty="0" smtClean="0"/>
-              <a:t>FILTERING</a:t>
+              <a:t>READING FILE FORMATS</a:t>
             </a:r>
             <a:endParaRPr lang="en-US" dirty="0"/>
           </a:p>
@@ -6484,6 +6551,81 @@
           <a:bodyPr/>
           <a:lstStyle/>
           <a:p>
+            <a:r>
+              <a:rPr lang="en-US" dirty="0" smtClean="0"/>
+              <a:t>Comma/Tab Separated Values: (.csv, .</a:t>
+            </a:r>
+            <a:r>
+              <a:rPr lang="en-US" dirty="0" err="1" smtClean="0"/>
+              <a:t>tsv</a:t>
+            </a:r>
+            <a:r>
+              <a:rPr lang="en-US" dirty="0" smtClean="0"/>
+              <a:t>)</a:t>
+            </a:r>
+          </a:p>
+          <a:p>
+            <a:pPr lvl="1"/>
+            <a:r>
+              <a:rPr lang="en-US" dirty="0" smtClean="0"/>
+              <a:t>Read.csv</a:t>
+            </a:r>
+          </a:p>
+          <a:p>
+            <a:r>
+              <a:rPr lang="en-US" dirty="0" smtClean="0"/>
+              <a:t>Excel files (.</a:t>
+            </a:r>
+            <a:r>
+              <a:rPr lang="en-US" dirty="0" err="1" smtClean="0"/>
+              <a:t>xlsx</a:t>
+            </a:r>
+            <a:r>
+              <a:rPr lang="en-US" dirty="0" smtClean="0"/>
+              <a:t>, .</a:t>
+            </a:r>
+            <a:r>
+              <a:rPr lang="en-US" dirty="0" err="1" smtClean="0"/>
+              <a:t>xls</a:t>
+            </a:r>
+            <a:r>
+              <a:rPr lang="en-US" dirty="0" smtClean="0"/>
+              <a:t>*)</a:t>
+            </a:r>
+          </a:p>
+          <a:p>
+            <a:r>
+              <a:rPr lang="en-US" dirty="0" smtClean="0"/>
+              <a:t>JSON (.</a:t>
+            </a:r>
+            <a:r>
+              <a:rPr lang="en-US" dirty="0" err="1" smtClean="0"/>
+              <a:t>json</a:t>
+            </a:r>
+            <a:r>
+              <a:rPr lang="en-US" dirty="0" smtClean="0"/>
+              <a:t>)</a:t>
+            </a:r>
+          </a:p>
+          <a:p>
+            <a:pPr lvl="1"/>
+            <a:r>
+              <a:rPr lang="en-US" dirty="0" smtClean="0"/>
+              <a:t>Example</a:t>
+            </a:r>
+          </a:p>
+          <a:p>
+            <a:r>
+              <a:rPr lang="en-US" dirty="0" smtClean="0"/>
+              <a:t>XML (.xml)</a:t>
+            </a:r>
+          </a:p>
+          <a:p>
+            <a:pPr lvl="1"/>
+            <a:r>
+              <a:rPr lang="en-US" dirty="0" smtClean="0"/>
+              <a:t>Example</a:t>
+            </a:r>
             <a:endParaRPr lang="en-US" dirty="0"/>
           </a:p>
         </p:txBody>
@@ -6588,7 +6730,7 @@
     </p:spTree>
     <p:extLst>
       <p:ext uri="{BB962C8B-B14F-4D97-AF65-F5344CB8AC3E}">
-        <p14:creationId xmlns:p14="http://schemas.microsoft.com/office/powerpoint/2010/main" val="3865024361"/>
+        <p14:creationId xmlns:p14="http://schemas.microsoft.com/office/powerpoint/2010/main" val="472407328"/>
       </p:ext>
     </p:extLst>
   </p:cSld>
@@ -6617,13 +6759,7 @@
       </p:grpSpPr>
       <p:sp>
         <p:nvSpPr>
-          <p:cNvPr id="7" name="Title 6">
-            <a:extLst>
-              <a:ext uri="{FF2B5EF4-FFF2-40B4-BE49-F238E27FC236}">
-                <a16:creationId xmlns:a16="http://schemas.microsoft.com/office/drawing/2014/main" id="{184E2338-1026-45D4-9455-B21A88F18B28}"/>
-              </a:ext>
-            </a:extLst>
-          </p:cNvPr>
+          <p:cNvPr id="7" name="Title 6"/>
           <p:cNvSpPr>
             <a:spLocks noGrp="1"/>
           </p:cNvSpPr>
@@ -6637,61 +6773,110 @@
           <a:lstStyle/>
           <a:p>
             <a:r>
-              <a:rPr lang="en-US" dirty="0"/>
-              <a:t>READING </a:t>
-            </a:r>
-            <a:r>
               <a:rPr lang="en-US" dirty="0" smtClean="0"/>
-              <a:t>AND </a:t>
-            </a:r>
-            <a:br>
+              <a:t>WRITING FILE FORMATS</a:t>
+            </a:r>
+            <a:endParaRPr lang="en-US" dirty="0"/>
+          </a:p>
+        </p:txBody>
+      </p:sp>
+      <p:sp>
+        <p:nvSpPr>
+          <p:cNvPr id="8" name="Content Placeholder 7"/>
+          <p:cNvSpPr>
+            <a:spLocks noGrp="1"/>
+          </p:cNvSpPr>
+          <p:nvPr>
+            <p:ph idx="1"/>
+          </p:nvPr>
+        </p:nvSpPr>
+        <p:spPr/>
+        <p:txBody>
+          <a:bodyPr/>
+          <a:lstStyle/>
+          <a:p>
+            <a:r>
               <a:rPr lang="en-US" dirty="0" smtClean="0"/>
-            </a:br>
+              <a:t>Comma/Tab Separated Values: (.csv, .</a:t>
+            </a:r>
+            <a:r>
+              <a:rPr lang="en-US" dirty="0" err="1" smtClean="0"/>
+              <a:t>tsv</a:t>
+            </a:r>
             <a:r>
               <a:rPr lang="en-US" dirty="0" smtClean="0"/>
-              <a:t>WRITING DATA</a:t>
-            </a:r>
-            <a:endParaRPr lang="en-US" dirty="0"/>
-          </a:p>
-        </p:txBody>
-      </p:sp>
-      <p:sp>
-        <p:nvSpPr>
-          <p:cNvPr id="8" name="Text Placeholder 7">
-            <a:extLst>
-              <a:ext uri="{FF2B5EF4-FFF2-40B4-BE49-F238E27FC236}">
-                <a16:creationId xmlns:a16="http://schemas.microsoft.com/office/drawing/2014/main" id="{DB42CCAB-C8E2-48A8-A9DF-EB0383A8B33C}"/>
-              </a:ext>
-            </a:extLst>
-          </p:cNvPr>
-          <p:cNvSpPr>
-            <a:spLocks noGrp="1"/>
-          </p:cNvSpPr>
-          <p:nvPr>
-            <p:ph type="body" idx="1"/>
-          </p:nvPr>
-        </p:nvSpPr>
-        <p:spPr/>
-        <p:txBody>
-          <a:bodyPr/>
-          <a:lstStyle/>
-          <a:p>
-            <a:r>
-              <a:rPr lang="en-US" dirty="0"/>
-              <a:t>Excel, Comma-Separated and Tab-Separated Values, and more!</a:t>
-            </a:r>
-          </a:p>
-        </p:txBody>
-      </p:sp>
-      <p:sp>
-        <p:nvSpPr>
-          <p:cNvPr id="4" name="Date Placeholder 3">
-            <a:extLst>
-              <a:ext uri="{FF2B5EF4-FFF2-40B4-BE49-F238E27FC236}">
-                <a16:creationId xmlns:a16="http://schemas.microsoft.com/office/drawing/2014/main" id="{1CA94ACB-62A5-4F09-8C21-F0CE9BFB1606}"/>
-              </a:ext>
-            </a:extLst>
-          </p:cNvPr>
+              <a:t>)</a:t>
+            </a:r>
+          </a:p>
+          <a:p>
+            <a:pPr lvl="1"/>
+            <a:r>
+              <a:rPr lang="en-US" dirty="0" smtClean="0"/>
+              <a:t>Write.csv</a:t>
+            </a:r>
+          </a:p>
+          <a:p>
+            <a:r>
+              <a:rPr lang="en-US" dirty="0" smtClean="0"/>
+              <a:t>Excel files (.</a:t>
+            </a:r>
+            <a:r>
+              <a:rPr lang="en-US" dirty="0" err="1" smtClean="0"/>
+              <a:t>xlsx</a:t>
+            </a:r>
+            <a:r>
+              <a:rPr lang="en-US" dirty="0" smtClean="0"/>
+              <a:t>, .</a:t>
+            </a:r>
+            <a:r>
+              <a:rPr lang="en-US" dirty="0" err="1" smtClean="0"/>
+              <a:t>xls</a:t>
+            </a:r>
+            <a:r>
+              <a:rPr lang="en-US" dirty="0" smtClean="0"/>
+              <a:t>*)</a:t>
+            </a:r>
+          </a:p>
+          <a:p>
+            <a:r>
+              <a:rPr lang="en-US" dirty="0" smtClean="0"/>
+              <a:t>JSON (.</a:t>
+            </a:r>
+            <a:r>
+              <a:rPr lang="en-US" dirty="0" err="1" smtClean="0"/>
+              <a:t>json</a:t>
+            </a:r>
+            <a:r>
+              <a:rPr lang="en-US" dirty="0" smtClean="0"/>
+              <a:t>)</a:t>
+            </a:r>
+          </a:p>
+          <a:p>
+            <a:pPr lvl="1"/>
+            <a:r>
+              <a:rPr lang="en-US" dirty="0" smtClean="0"/>
+              <a:t>Example</a:t>
+            </a:r>
+          </a:p>
+          <a:p>
+            <a:r>
+              <a:rPr lang="en-US" dirty="0" smtClean="0"/>
+              <a:t>XML (.xml)</a:t>
+            </a:r>
+          </a:p>
+          <a:p>
+            <a:pPr lvl="1"/>
+            <a:r>
+              <a:rPr lang="en-US" dirty="0" smtClean="0"/>
+              <a:t>Example</a:t>
+            </a:r>
+            <a:endParaRPr lang="en-US" dirty="0"/>
+          </a:p>
+        </p:txBody>
+      </p:sp>
+      <p:sp>
+        <p:nvSpPr>
+          <p:cNvPr id="4" name="Date Placeholder 3"/>
           <p:cNvSpPr>
             <a:spLocks noGrp="1"/>
           </p:cNvSpPr>
@@ -6704,7 +6889,7 @@
           <a:bodyPr/>
           <a:lstStyle/>
           <a:p>
-            <a:fld id="{8AAE40A0-A7D8-4DC3-BC9E-BADA32DA2004}" type="datetime4">
+            <a:fld id="{B08FEED8-D7D4-44E9-BFBC-ED06B5996D94}" type="datetime4">
               <a:rPr lang="en-US" smtClean="0"/>
               <a:t>June 25, 2019</a:t>
             </a:fld>
@@ -6714,13 +6899,7 @@
       </p:sp>
       <p:sp>
         <p:nvSpPr>
-          <p:cNvPr id="5" name="Footer Placeholder 4">
-            <a:extLst>
-              <a:ext uri="{FF2B5EF4-FFF2-40B4-BE49-F238E27FC236}">
-                <a16:creationId xmlns:a16="http://schemas.microsoft.com/office/drawing/2014/main" id="{D20B02B0-893D-4696-B6F7-A126B8D18E99}"/>
-              </a:ext>
-            </a:extLst>
-          </p:cNvPr>
+          <p:cNvPr id="5" name="Footer Placeholder 4"/>
           <p:cNvSpPr>
             <a:spLocks noGrp="1"/>
           </p:cNvSpPr>
@@ -6734,11 +6913,11 @@
           <a:lstStyle/>
           <a:p>
             <a:r>
-              <a:rPr lang="en-US"/>
+              <a:rPr lang="en-US" smtClean="0"/>
               <a:t>Digital Scholarship Services </a:t>
             </a:r>
             <a:r>
-              <a:rPr lang="en-US">
+              <a:rPr lang="en-US" smtClean="0">
                 <a:solidFill>
                   <a:schemeClr val="accent1">
                     <a:lumMod val="50000"/>
@@ -6748,11 +6927,11 @@
               <a:t>| Email</a:t>
             </a:r>
             <a:r>
-              <a:rPr lang="en-US"/>
+              <a:rPr lang="en-US" smtClean="0"/>
               <a:t> cf24@rice.edu </a:t>
             </a:r>
             <a:r>
-              <a:rPr lang="en-US">
+              <a:rPr lang="en-US" smtClean="0">
                 <a:solidFill>
                   <a:schemeClr val="accent1">
                     <a:lumMod val="50000"/>
@@ -6762,7 +6941,7 @@
               <a:t>|</a:t>
             </a:r>
             <a:r>
-              <a:rPr lang="en-US"/>
+              <a:rPr lang="en-US" smtClean="0"/>
               <a:t> library.rice.edu/dss</a:t>
             </a:r>
             <a:endParaRPr lang="en-US" dirty="0"/>
@@ -6771,13 +6950,7 @@
       </p:sp>
       <p:sp>
         <p:nvSpPr>
-          <p:cNvPr id="6" name="Slide Number Placeholder 5">
-            <a:extLst>
-              <a:ext uri="{FF2B5EF4-FFF2-40B4-BE49-F238E27FC236}">
-                <a16:creationId xmlns:a16="http://schemas.microsoft.com/office/drawing/2014/main" id="{1CFDA495-0063-4571-8969-0DD770DB39E0}"/>
-              </a:ext>
-            </a:extLst>
-          </p:cNvPr>
+          <p:cNvPr id="6" name="Slide Number Placeholder 5"/>
           <p:cNvSpPr>
             <a:spLocks noGrp="1"/>
           </p:cNvSpPr>
@@ -6801,7 +6974,7 @@
     </p:spTree>
     <p:extLst>
       <p:ext uri="{BB962C8B-B14F-4D97-AF65-F5344CB8AC3E}">
-        <p14:creationId xmlns:p14="http://schemas.microsoft.com/office/powerpoint/2010/main" val="2581962988"/>
+        <p14:creationId xmlns:p14="http://schemas.microsoft.com/office/powerpoint/2010/main" val="880888547"/>
       </p:ext>
     </p:extLst>
   </p:cSld>
@@ -6830,7 +7003,13 @@
       </p:grpSpPr>
       <p:sp>
         <p:nvSpPr>
-          <p:cNvPr id="7" name="Title 6"/>
+          <p:cNvPr id="7" name="Title 6">
+            <a:extLst>
+              <a:ext uri="{FF2B5EF4-FFF2-40B4-BE49-F238E27FC236}">
+                <a16:creationId xmlns:a16="http://schemas.microsoft.com/office/drawing/2014/main" id="{184E2338-1026-45D4-9455-B21A88F18B28}"/>
+              </a:ext>
+            </a:extLst>
+          </p:cNvPr>
           <p:cNvSpPr>
             <a:spLocks noGrp="1"/>
           </p:cNvSpPr>
@@ -6845,20 +7024,26 @@
           <a:p>
             <a:r>
               <a:rPr lang="en-US" dirty="0" smtClean="0"/>
-              <a:t>COMMON FILE FORMATS</a:t>
-            </a:r>
-            <a:endParaRPr lang="en-US" dirty="0"/>
-          </a:p>
-        </p:txBody>
-      </p:sp>
-      <p:sp>
-        <p:nvSpPr>
-          <p:cNvPr id="8" name="Content Placeholder 7"/>
-          <p:cNvSpPr>
-            <a:spLocks noGrp="1"/>
-          </p:cNvSpPr>
-          <p:nvPr>
-            <p:ph idx="1"/>
+              <a:t>DATA MANIPULATION</a:t>
+            </a:r>
+            <a:endParaRPr lang="en-US" dirty="0"/>
+          </a:p>
+        </p:txBody>
+      </p:sp>
+      <p:sp>
+        <p:nvSpPr>
+          <p:cNvPr id="8" name="Text Placeholder 7">
+            <a:extLst>
+              <a:ext uri="{FF2B5EF4-FFF2-40B4-BE49-F238E27FC236}">
+                <a16:creationId xmlns:a16="http://schemas.microsoft.com/office/drawing/2014/main" id="{DB42CCAB-C8E2-48A8-A9DF-EB0383A8B33C}"/>
+              </a:ext>
+            </a:extLst>
+          </p:cNvPr>
+          <p:cNvSpPr>
+            <a:spLocks noGrp="1"/>
+          </p:cNvSpPr>
+          <p:nvPr>
+            <p:ph type="body" idx="1"/>
           </p:nvPr>
         </p:nvSpPr>
         <p:spPr/>
@@ -6868,86 +7053,29 @@
           <a:p>
             <a:r>
               <a:rPr lang="en-US" dirty="0" smtClean="0"/>
-              <a:t>Comma/Tab Separated Values: (.csv, .</a:t>
-            </a:r>
-            <a:r>
-              <a:rPr lang="en-US" dirty="0" err="1" smtClean="0"/>
-              <a:t>tsv</a:t>
+              <a:t>Subsetting</a:t>
+            </a:r>
+            <a:r>
+              <a:rPr lang="en-US" dirty="0"/>
+              <a:t> </a:t>
             </a:r>
             <a:r>
               <a:rPr lang="en-US" dirty="0" smtClean="0"/>
-              <a:t>)</a:t>
-            </a:r>
-          </a:p>
-          <a:p>
-            <a:pPr lvl="1"/>
-            <a:r>
-              <a:rPr lang="en-US" dirty="0" smtClean="0"/>
-              <a:t>Example</a:t>
-            </a:r>
-          </a:p>
-          <a:p>
-            <a:r>
-              <a:rPr lang="en-US" dirty="0" smtClean="0"/>
-              <a:t>Excel files (.</a:t>
-            </a:r>
-            <a:r>
-              <a:rPr lang="en-US" dirty="0" err="1" smtClean="0"/>
-              <a:t>xlsx</a:t>
-            </a:r>
-            <a:r>
-              <a:rPr lang="en-US" dirty="0" smtClean="0"/>
-              <a:t>, .</a:t>
-            </a:r>
-            <a:r>
-              <a:rPr lang="en-US" dirty="0" err="1" smtClean="0"/>
-              <a:t>xls</a:t>
-            </a:r>
-            <a:r>
-              <a:rPr lang="en-US" dirty="0" smtClean="0"/>
-              <a:t>*)</a:t>
-            </a:r>
-          </a:p>
-          <a:p>
-            <a:r>
-              <a:rPr lang="en-US" dirty="0" smtClean="0"/>
-              <a:t>JSON (.</a:t>
-            </a:r>
-            <a:r>
-              <a:rPr lang="en-US" dirty="0" err="1" smtClean="0"/>
-              <a:t>json</a:t>
-            </a:r>
-            <a:r>
-              <a:rPr lang="en-US" dirty="0" smtClean="0"/>
-              <a:t>)</a:t>
-            </a:r>
-          </a:p>
-          <a:p>
-            <a:pPr lvl="1"/>
-            <a:r>
-              <a:rPr lang="en-US" dirty="0" smtClean="0"/>
-              <a:t>Example</a:t>
-            </a:r>
-          </a:p>
-          <a:p>
-            <a:r>
-              <a:rPr lang="en-US" dirty="0" smtClean="0"/>
-              <a:t>XML (.xml)</a:t>
-            </a:r>
-          </a:p>
-          <a:p>
-            <a:pPr lvl="1"/>
-            <a:r>
-              <a:rPr lang="en-US" dirty="0" smtClean="0"/>
-              <a:t>Example</a:t>
-            </a:r>
-            <a:endParaRPr lang="en-US" dirty="0"/>
-          </a:p>
-        </p:txBody>
-      </p:sp>
-      <p:sp>
-        <p:nvSpPr>
-          <p:cNvPr id="4" name="Date Placeholder 3"/>
+              <a:t>and filtering</a:t>
+            </a:r>
+            <a:endParaRPr lang="en-US" dirty="0"/>
+          </a:p>
+        </p:txBody>
+      </p:sp>
+      <p:sp>
+        <p:nvSpPr>
+          <p:cNvPr id="4" name="Date Placeholder 3">
+            <a:extLst>
+              <a:ext uri="{FF2B5EF4-FFF2-40B4-BE49-F238E27FC236}">
+                <a16:creationId xmlns:a16="http://schemas.microsoft.com/office/drawing/2014/main" id="{1CA94ACB-62A5-4F09-8C21-F0CE9BFB1606}"/>
+              </a:ext>
+            </a:extLst>
+          </p:cNvPr>
           <p:cNvSpPr>
             <a:spLocks noGrp="1"/>
           </p:cNvSpPr>
@@ -6960,7 +7088,7 @@
           <a:bodyPr/>
           <a:lstStyle/>
           <a:p>
-            <a:fld id="{B08FEED8-D7D4-44E9-BFBC-ED06B5996D94}" type="datetime4">
+            <a:fld id="{8AAE40A0-A7D8-4DC3-BC9E-BADA32DA2004}" type="datetime4">
               <a:rPr lang="en-US" smtClean="0"/>
               <a:t>June 25, 2019</a:t>
             </a:fld>
@@ -6970,7 +7098,13 @@
       </p:sp>
       <p:sp>
         <p:nvSpPr>
-          <p:cNvPr id="5" name="Footer Placeholder 4"/>
+          <p:cNvPr id="5" name="Footer Placeholder 4">
+            <a:extLst>
+              <a:ext uri="{FF2B5EF4-FFF2-40B4-BE49-F238E27FC236}">
+                <a16:creationId xmlns:a16="http://schemas.microsoft.com/office/drawing/2014/main" id="{D20B02B0-893D-4696-B6F7-A126B8D18E99}"/>
+              </a:ext>
+            </a:extLst>
+          </p:cNvPr>
           <p:cNvSpPr>
             <a:spLocks noGrp="1"/>
           </p:cNvSpPr>
@@ -6984,11 +7118,11 @@
           <a:lstStyle/>
           <a:p>
             <a:r>
-              <a:rPr lang="en-US" smtClean="0"/>
+              <a:rPr lang="en-US"/>
               <a:t>Digital Scholarship Services </a:t>
             </a:r>
             <a:r>
-              <a:rPr lang="en-US" smtClean="0">
+              <a:rPr lang="en-US">
                 <a:solidFill>
                   <a:schemeClr val="accent1">
                     <a:lumMod val="50000"/>
@@ -6998,11 +7132,11 @@
               <a:t>| Email</a:t>
             </a:r>
             <a:r>
-              <a:rPr lang="en-US" smtClean="0"/>
+              <a:rPr lang="en-US"/>
               <a:t> cf24@rice.edu </a:t>
             </a:r>
             <a:r>
-              <a:rPr lang="en-US" smtClean="0">
+              <a:rPr lang="en-US">
                 <a:solidFill>
                   <a:schemeClr val="accent1">
                     <a:lumMod val="50000"/>
@@ -7012,7 +7146,7 @@
               <a:t>|</a:t>
             </a:r>
             <a:r>
-              <a:rPr lang="en-US" smtClean="0"/>
+              <a:rPr lang="en-US"/>
               <a:t> library.rice.edu/dss</a:t>
             </a:r>
             <a:endParaRPr lang="en-US" dirty="0"/>
@@ -7021,7 +7155,13 @@
       </p:sp>
       <p:sp>
         <p:nvSpPr>
-          <p:cNvPr id="6" name="Slide Number Placeholder 5"/>
+          <p:cNvPr id="6" name="Slide Number Placeholder 5">
+            <a:extLst>
+              <a:ext uri="{FF2B5EF4-FFF2-40B4-BE49-F238E27FC236}">
+                <a16:creationId xmlns:a16="http://schemas.microsoft.com/office/drawing/2014/main" id="{1CFDA495-0063-4571-8969-0DD770DB39E0}"/>
+              </a:ext>
+            </a:extLst>
+          </p:cNvPr>
           <p:cNvSpPr>
             <a:spLocks noGrp="1"/>
           </p:cNvSpPr>
@@ -7045,7 +7185,7 @@
     </p:spTree>
     <p:extLst>
       <p:ext uri="{BB962C8B-B14F-4D97-AF65-F5344CB8AC3E}">
-        <p14:creationId xmlns:p14="http://schemas.microsoft.com/office/powerpoint/2010/main" val="3674866452"/>
+        <p14:creationId xmlns:p14="http://schemas.microsoft.com/office/powerpoint/2010/main" val="495434477"/>
       </p:ext>
     </p:extLst>
   </p:cSld>
@@ -7089,7 +7229,7 @@
           <a:p>
             <a:r>
               <a:rPr lang="en-US" dirty="0" smtClean="0"/>
-              <a:t>READING FILE FORMATS</a:t>
+              <a:t>SUBSETTING</a:t>
             </a:r>
             <a:endParaRPr lang="en-US" dirty="0"/>
           </a:p>
@@ -7112,78 +7252,13 @@
           <a:p>
             <a:r>
               <a:rPr lang="en-US" dirty="0" smtClean="0"/>
-              <a:t>Comma/Tab Separated Values: (.csv, .</a:t>
-            </a:r>
-            <a:r>
-              <a:rPr lang="en-US" dirty="0" err="1" smtClean="0"/>
-              <a:t>tsv</a:t>
-            </a:r>
+              <a:t>By Row:</a:t>
+            </a:r>
+          </a:p>
+          <a:p>
             <a:r>
               <a:rPr lang="en-US" dirty="0" smtClean="0"/>
-              <a:t>)</a:t>
-            </a:r>
-          </a:p>
-          <a:p>
-            <a:pPr lvl="1"/>
-            <a:r>
-              <a:rPr lang="en-US" dirty="0" smtClean="0"/>
-              <a:t>Read.csv</a:t>
-            </a:r>
-          </a:p>
-          <a:p>
-            <a:r>
-              <a:rPr lang="en-US" dirty="0" smtClean="0"/>
-              <a:t>Excel files (.</a:t>
-            </a:r>
-            <a:r>
-              <a:rPr lang="en-US" dirty="0" err="1" smtClean="0"/>
-              <a:t>xlsx</a:t>
-            </a:r>
-            <a:r>
-              <a:rPr lang="en-US" dirty="0" smtClean="0"/>
-              <a:t>, .</a:t>
-            </a:r>
-            <a:r>
-              <a:rPr lang="en-US" dirty="0" err="1" smtClean="0"/>
-              <a:t>xls</a:t>
-            </a:r>
-            <a:r>
-              <a:rPr lang="en-US" dirty="0" smtClean="0"/>
-              <a:t>*)</a:t>
-            </a:r>
-          </a:p>
-          <a:p>
-            <a:r>
-              <a:rPr lang="en-US" dirty="0" smtClean="0"/>
-              <a:t>JSON (.</a:t>
-            </a:r>
-            <a:r>
-              <a:rPr lang="en-US" dirty="0" err="1" smtClean="0"/>
-              <a:t>json</a:t>
-            </a:r>
-            <a:r>
-              <a:rPr lang="en-US" dirty="0" smtClean="0"/>
-              <a:t>)</a:t>
-            </a:r>
-          </a:p>
-          <a:p>
-            <a:pPr lvl="1"/>
-            <a:r>
-              <a:rPr lang="en-US" dirty="0" smtClean="0"/>
-              <a:t>Example</a:t>
-            </a:r>
-          </a:p>
-          <a:p>
-            <a:r>
-              <a:rPr lang="en-US" dirty="0" smtClean="0"/>
-              <a:t>XML (.xml)</a:t>
-            </a:r>
-          </a:p>
-          <a:p>
-            <a:pPr lvl="1"/>
-            <a:r>
-              <a:rPr lang="en-US" dirty="0" smtClean="0"/>
-              <a:t>Example</a:t>
+              <a:t>By Column:</a:t>
             </a:r>
             <a:endParaRPr lang="en-US" dirty="0"/>
           </a:p>
@@ -7289,7 +7364,7 @@
     </p:spTree>
     <p:extLst>
       <p:ext uri="{BB962C8B-B14F-4D97-AF65-F5344CB8AC3E}">
-        <p14:creationId xmlns:p14="http://schemas.microsoft.com/office/powerpoint/2010/main" val="472407328"/>
+        <p14:creationId xmlns:p14="http://schemas.microsoft.com/office/powerpoint/2010/main" val="3381129877"/>
       </p:ext>
     </p:extLst>
   </p:cSld>
@@ -7333,7 +7408,7 @@
           <a:p>
             <a:r>
               <a:rPr lang="en-US" dirty="0" smtClean="0"/>
-              <a:t>WRITING FILE FORMATS</a:t>
+              <a:t>FILTERING</a:t>
             </a:r>
             <a:endParaRPr lang="en-US" dirty="0"/>
           </a:p>
@@ -7354,81 +7429,6 @@
           <a:bodyPr/>
           <a:lstStyle/>
           <a:p>
-            <a:r>
-              <a:rPr lang="en-US" dirty="0" smtClean="0"/>
-              <a:t>Comma/Tab Separated Values: (.csv, .</a:t>
-            </a:r>
-            <a:r>
-              <a:rPr lang="en-US" dirty="0" err="1" smtClean="0"/>
-              <a:t>tsv</a:t>
-            </a:r>
-            <a:r>
-              <a:rPr lang="en-US" dirty="0" smtClean="0"/>
-              <a:t>)</a:t>
-            </a:r>
-          </a:p>
-          <a:p>
-            <a:pPr lvl="1"/>
-            <a:r>
-              <a:rPr lang="en-US" dirty="0" smtClean="0"/>
-              <a:t>Write.csv</a:t>
-            </a:r>
-          </a:p>
-          <a:p>
-            <a:r>
-              <a:rPr lang="en-US" dirty="0" smtClean="0"/>
-              <a:t>Excel files (.</a:t>
-            </a:r>
-            <a:r>
-              <a:rPr lang="en-US" dirty="0" err="1" smtClean="0"/>
-              <a:t>xlsx</a:t>
-            </a:r>
-            <a:r>
-              <a:rPr lang="en-US" dirty="0" smtClean="0"/>
-              <a:t>, .</a:t>
-            </a:r>
-            <a:r>
-              <a:rPr lang="en-US" dirty="0" err="1" smtClean="0"/>
-              <a:t>xls</a:t>
-            </a:r>
-            <a:r>
-              <a:rPr lang="en-US" dirty="0" smtClean="0"/>
-              <a:t>*)</a:t>
-            </a:r>
-          </a:p>
-          <a:p>
-            <a:r>
-              <a:rPr lang="en-US" dirty="0" smtClean="0"/>
-              <a:t>JSON (.</a:t>
-            </a:r>
-            <a:r>
-              <a:rPr lang="en-US" dirty="0" err="1" smtClean="0"/>
-              <a:t>json</a:t>
-            </a:r>
-            <a:r>
-              <a:rPr lang="en-US" dirty="0" smtClean="0"/>
-              <a:t>)</a:t>
-            </a:r>
-          </a:p>
-          <a:p>
-            <a:pPr lvl="1"/>
-            <a:r>
-              <a:rPr lang="en-US" dirty="0" smtClean="0"/>
-              <a:t>Example</a:t>
-            </a:r>
-          </a:p>
-          <a:p>
-            <a:r>
-              <a:rPr lang="en-US" dirty="0" smtClean="0"/>
-              <a:t>XML (.xml)</a:t>
-            </a:r>
-          </a:p>
-          <a:p>
-            <a:pPr lvl="1"/>
-            <a:r>
-              <a:rPr lang="en-US" dirty="0" smtClean="0"/>
-              <a:t>Example</a:t>
-            </a:r>
             <a:endParaRPr lang="en-US" dirty="0"/>
           </a:p>
         </p:txBody>
@@ -7533,7 +7533,7 @@
     </p:spTree>
     <p:extLst>
       <p:ext uri="{BB962C8B-B14F-4D97-AF65-F5344CB8AC3E}">
-        <p14:creationId xmlns:p14="http://schemas.microsoft.com/office/powerpoint/2010/main" val="880888547"/>
+        <p14:creationId xmlns:p14="http://schemas.microsoft.com/office/powerpoint/2010/main" val="2527648360"/>
       </p:ext>
     </p:extLst>
   </p:cSld>

</xml_diff>

<commit_message>
more learnr + ppt updates
</commit_message>
<xml_diff>
--- a/introR/Introduction to R.pptx
+++ b/introR/Introduction to R.pptx
@@ -22,25 +22,25 @@
     <p:sldId id="269" r:id="rId13"/>
     <p:sldId id="281" r:id="rId14"/>
     <p:sldId id="283" r:id="rId15"/>
-    <p:sldId id="282" r:id="rId16"/>
-    <p:sldId id="308" r:id="rId17"/>
-    <p:sldId id="284" r:id="rId18"/>
-    <p:sldId id="307" r:id="rId19"/>
-    <p:sldId id="288" r:id="rId20"/>
-    <p:sldId id="286" r:id="rId21"/>
-    <p:sldId id="285" r:id="rId22"/>
-    <p:sldId id="267" r:id="rId23"/>
-    <p:sldId id="291" r:id="rId24"/>
-    <p:sldId id="293" r:id="rId25"/>
-    <p:sldId id="294" r:id="rId26"/>
-    <p:sldId id="304" r:id="rId27"/>
-    <p:sldId id="301" r:id="rId28"/>
-    <p:sldId id="302" r:id="rId29"/>
-    <p:sldId id="303" r:id="rId30"/>
-    <p:sldId id="309" r:id="rId31"/>
-    <p:sldId id="310" r:id="rId32"/>
-    <p:sldId id="305" r:id="rId33"/>
-    <p:sldId id="306" r:id="rId34"/>
+    <p:sldId id="308" r:id="rId16"/>
+    <p:sldId id="284" r:id="rId17"/>
+    <p:sldId id="307" r:id="rId18"/>
+    <p:sldId id="288" r:id="rId19"/>
+    <p:sldId id="286" r:id="rId20"/>
+    <p:sldId id="285" r:id="rId21"/>
+    <p:sldId id="311" r:id="rId22"/>
+    <p:sldId id="313" r:id="rId23"/>
+    <p:sldId id="267" r:id="rId24"/>
+    <p:sldId id="291" r:id="rId25"/>
+    <p:sldId id="293" r:id="rId26"/>
+    <p:sldId id="294" r:id="rId27"/>
+    <p:sldId id="304" r:id="rId28"/>
+    <p:sldId id="301" r:id="rId29"/>
+    <p:sldId id="312" r:id="rId30"/>
+    <p:sldId id="302" r:id="rId31"/>
+    <p:sldId id="309" r:id="rId32"/>
+    <p:sldId id="310" r:id="rId33"/>
+    <p:sldId id="305" r:id="rId34"/>
     <p:sldId id="272" r:id="rId35"/>
     <p:sldId id="295" r:id="rId36"/>
     <p:sldId id="296" r:id="rId37"/>
@@ -153,14 +153,6 @@
     </p:ext>
   </p:extLst>
 </p:presentation>
-</file>
-
-<file path=ppt/revisionInfo.xml><?xml version="1.0" encoding="utf-8"?>
-<p1510:revInfo xmlns:a="http://schemas.openxmlformats.org/drawingml/2006/main" xmlns:r="http://schemas.openxmlformats.org/officeDocument/2006/relationships" xmlns:p1510="http://schemas.microsoft.com/office/powerpoint/2015/10/main">
-  <p1510:revLst>
-    <p1510:client id="{D757F5B3-0678-46AB-8D95-A69C2A76921D}" v="17" dt="2019-06-19T19:23:33.605"/>
-  </p1510:revLst>
-</p1510:revInfo>
 </file>
 
 <file path=ppt/notesMasters/notesMaster1.xml><?xml version="1.0" encoding="utf-8"?>
@@ -4626,7 +4618,7 @@
             <a:pPr lvl="1"/>
             <a:r>
               <a:rPr lang="en-US" dirty="0"/>
-              <a:t>Logical: True or False</a:t>
+              <a:t>Logical: TRUE or FALSE</a:t>
             </a:r>
           </a:p>
           <a:p>
@@ -4827,7 +4819,7 @@
             </a:r>
             <a:r>
               <a:rPr lang="en-US" dirty="0"/>
-              <a:t> function</a:t>
+              <a:t> function (concatenate)</a:t>
             </a:r>
           </a:p>
           <a:p>
@@ -5089,7 +5081,9 @@
         </p:nvSpPr>
         <p:spPr/>
         <p:txBody>
-          <a:bodyPr/>
+          <a:bodyPr>
+            <a:normAutofit lnSpcReduction="10000"/>
+          </a:bodyPr>
           <a:lstStyle/>
           <a:p>
             <a:r>
@@ -5130,7 +5124,7 @@
           <a:p>
             <a:r>
               <a:rPr lang="en-US" dirty="0"/>
-              <a:t>Access by subscript. If </a:t>
+              <a:t>Can always access by subscript. If </a:t>
             </a:r>
             <a:r>
               <a:rPr lang="en-US" dirty="0">
@@ -5143,14 +5137,14 @@
               <a:rPr lang="en-US" dirty="0">
                 <a:cs typeface="Courier New" panose="02070309020205020404" pitchFamily="49" charset="0"/>
               </a:rPr>
-              <a:t>is a vector, </a:t>
+              <a:t>is a list, </a:t>
             </a:r>
             <a:r>
               <a:rPr lang="en-US" dirty="0">
                 <a:latin typeface="Courier New" panose="02070309020205020404" pitchFamily="49" charset="0"/>
                 <a:cs typeface="Courier New" panose="02070309020205020404" pitchFamily="49" charset="0"/>
               </a:rPr>
-              <a:t>a[1] </a:t>
+              <a:t>a[[1]] </a:t>
             </a:r>
             <a:r>
               <a:rPr lang="en-US" dirty="0">
@@ -5168,9 +5162,54 @@
               <a:rPr lang="en-US" dirty="0">
                 <a:cs typeface="Courier New" panose="02070309020205020404" pitchFamily="49" charset="0"/>
               </a:rPr>
-              <a:t> element.</a:t>
-            </a:r>
-            <a:endParaRPr lang="en-US" dirty="0"/>
+              <a:t> element</a:t>
+            </a:r>
+          </a:p>
+          <a:p>
+            <a:r>
+              <a:rPr lang="en-US" dirty="0">
+                <a:cs typeface="Courier New" panose="02070309020205020404" pitchFamily="49" charset="0"/>
+              </a:rPr>
+              <a:t>Also, can access by giving custom names to values!</a:t>
+            </a:r>
+          </a:p>
+          <a:p>
+            <a:pPr lvl="1"/>
+            <a:r>
+              <a:rPr lang="en-US" dirty="0">
+                <a:latin typeface="Courier New" panose="02070309020205020404" pitchFamily="49" charset="0"/>
+                <a:cs typeface="Courier New" panose="02070309020205020404" pitchFamily="49" charset="0"/>
+              </a:rPr>
+              <a:t>ages &lt;- list(16, 17); names(ages) &lt;- c(“</a:t>
+            </a:r>
+            <a:r>
+              <a:rPr lang="en-US" dirty="0" err="1">
+                <a:latin typeface="Courier New" panose="02070309020205020404" pitchFamily="49" charset="0"/>
+                <a:cs typeface="Courier New" panose="02070309020205020404" pitchFamily="49" charset="0"/>
+              </a:rPr>
+              <a:t>steve</a:t>
+            </a:r>
+            <a:r>
+              <a:rPr lang="en-US" dirty="0">
+                <a:latin typeface="Courier New" panose="02070309020205020404" pitchFamily="49" charset="0"/>
+                <a:cs typeface="Courier New" panose="02070309020205020404" pitchFamily="49" charset="0"/>
+              </a:rPr>
+              <a:t>”, “tony”)</a:t>
+            </a:r>
+          </a:p>
+          <a:p>
+            <a:pPr lvl="1"/>
+            <a:r>
+              <a:rPr lang="en-US" dirty="0" err="1">
+                <a:latin typeface="Courier New" panose="02070309020205020404" pitchFamily="49" charset="0"/>
+                <a:cs typeface="Courier New" panose="02070309020205020404" pitchFamily="49" charset="0"/>
+              </a:rPr>
+              <a:t>ages$steve</a:t>
+            </a:r>
+            <a:endParaRPr lang="en-US" dirty="0">
+              <a:latin typeface="Courier New" panose="02070309020205020404" pitchFamily="49" charset="0"/>
+              <a:cs typeface="Courier New" panose="02070309020205020404" pitchFamily="49" charset="0"/>
+            </a:endParaRPr>
           </a:p>
           <a:p>
             <a:endParaRPr lang="en-US" dirty="0"/>
@@ -5269,302 +5308,6 @@
             <a:fld id="{D57F1E4F-1CFF-5643-939E-02111984F565}" type="slidenum">
               <a:rPr lang="en-US" smtClean="0"/>
               <a:t>15</a:t>
-            </a:fld>
-            <a:endParaRPr lang="en-US" dirty="0"/>
-          </a:p>
-        </p:txBody>
-      </p:sp>
-    </p:spTree>
-    <p:extLst>
-      <p:ext uri="{BB962C8B-B14F-4D97-AF65-F5344CB8AC3E}">
-        <p14:creationId xmlns:p14="http://schemas.microsoft.com/office/powerpoint/2010/main" val="388498116"/>
-      </p:ext>
-    </p:extLst>
-  </p:cSld>
-  <p:clrMapOvr>
-    <a:masterClrMapping/>
-  </p:clrMapOvr>
-</p:sld>
-</file>
-
-<file path=ppt/slides/slide16.xml><?xml version="1.0" encoding="utf-8"?>
-<p:sld xmlns:a="http://schemas.openxmlformats.org/drawingml/2006/main" xmlns:r="http://schemas.openxmlformats.org/officeDocument/2006/relationships" xmlns:p="http://schemas.openxmlformats.org/presentationml/2006/main">
-  <p:cSld>
-    <p:spTree>
-      <p:nvGrpSpPr>
-        <p:cNvPr id="1" name=""/>
-        <p:cNvGrpSpPr/>
-        <p:nvPr/>
-      </p:nvGrpSpPr>
-      <p:grpSpPr>
-        <a:xfrm>
-          <a:off x="0" y="0"/>
-          <a:ext cx="0" cy="0"/>
-          <a:chOff x="0" y="0"/>
-          <a:chExt cx="0" cy="0"/>
-        </a:xfrm>
-      </p:grpSpPr>
-      <p:sp>
-        <p:nvSpPr>
-          <p:cNvPr id="2" name="Title 1"/>
-          <p:cNvSpPr>
-            <a:spLocks noGrp="1"/>
-          </p:cNvSpPr>
-          <p:nvPr>
-            <p:ph type="title"/>
-          </p:nvPr>
-        </p:nvSpPr>
-        <p:spPr/>
-        <p:txBody>
-          <a:bodyPr/>
-          <a:lstStyle/>
-          <a:p>
-            <a:r>
-              <a:rPr lang="en-US" dirty="0"/>
-              <a:t>LISTS</a:t>
-            </a:r>
-          </a:p>
-        </p:txBody>
-      </p:sp>
-      <p:sp>
-        <p:nvSpPr>
-          <p:cNvPr id="3" name="Content Placeholder 2"/>
-          <p:cNvSpPr>
-            <a:spLocks noGrp="1"/>
-          </p:cNvSpPr>
-          <p:nvPr>
-            <p:ph idx="1"/>
-          </p:nvPr>
-        </p:nvSpPr>
-        <p:spPr/>
-        <p:txBody>
-          <a:bodyPr>
-            <a:normAutofit lnSpcReduction="10000"/>
-          </a:bodyPr>
-          <a:lstStyle/>
-          <a:p>
-            <a:r>
-              <a:rPr lang="en-US" dirty="0"/>
-              <a:t>Variable list of values of any type</a:t>
-            </a:r>
-          </a:p>
-          <a:p>
-            <a:r>
-              <a:rPr lang="en-US" dirty="0"/>
-              <a:t>Created with the </a:t>
-            </a:r>
-            <a:r>
-              <a:rPr lang="en-US" dirty="0">
-                <a:latin typeface="Courier New" panose="02070309020205020404" pitchFamily="49" charset="0"/>
-                <a:cs typeface="Courier New" panose="02070309020205020404" pitchFamily="49" charset="0"/>
-              </a:rPr>
-              <a:t>list()</a:t>
-            </a:r>
-            <a:r>
-              <a:rPr lang="en-US" dirty="0"/>
-              <a:t> function</a:t>
-            </a:r>
-          </a:p>
-          <a:p>
-            <a:r>
-              <a:rPr lang="en-US" dirty="0"/>
-              <a:t>Examples: </a:t>
-            </a:r>
-            <a:r>
-              <a:rPr lang="en-US" dirty="0">
-                <a:latin typeface="Courier New" panose="02070309020205020404" pitchFamily="49" charset="0"/>
-                <a:cs typeface="Courier New" panose="02070309020205020404" pitchFamily="49" charset="0"/>
-              </a:rPr>
-              <a:t>list(1, 2, 3), c(0.4, 0.5), c(“hello”, “hi”), list(1, “hello”)</a:t>
-            </a:r>
-          </a:p>
-          <a:p>
-            <a:r>
-              <a:rPr lang="en-US" dirty="0"/>
-              <a:t>Can always access by subscript. If </a:t>
-            </a:r>
-            <a:r>
-              <a:rPr lang="en-US" dirty="0">
-                <a:latin typeface="Courier New" panose="02070309020205020404" pitchFamily="49" charset="0"/>
-                <a:cs typeface="Courier New" panose="02070309020205020404" pitchFamily="49" charset="0"/>
-              </a:rPr>
-              <a:t>a </a:t>
-            </a:r>
-            <a:r>
-              <a:rPr lang="en-US" dirty="0">
-                <a:cs typeface="Courier New" panose="02070309020205020404" pitchFamily="49" charset="0"/>
-              </a:rPr>
-              <a:t>is a list, </a:t>
-            </a:r>
-            <a:r>
-              <a:rPr lang="en-US" dirty="0">
-                <a:latin typeface="Courier New" panose="02070309020205020404" pitchFamily="49" charset="0"/>
-                <a:cs typeface="Courier New" panose="02070309020205020404" pitchFamily="49" charset="0"/>
-              </a:rPr>
-              <a:t>a[[1]] </a:t>
-            </a:r>
-            <a:r>
-              <a:rPr lang="en-US" dirty="0">
-                <a:cs typeface="Courier New" panose="02070309020205020404" pitchFamily="49" charset="0"/>
-              </a:rPr>
-              <a:t>returns the 1</a:t>
-            </a:r>
-            <a:r>
-              <a:rPr lang="en-US" baseline="30000" dirty="0">
-                <a:cs typeface="Courier New" panose="02070309020205020404" pitchFamily="49" charset="0"/>
-              </a:rPr>
-              <a:t>st</a:t>
-            </a:r>
-            <a:r>
-              <a:rPr lang="en-US" dirty="0">
-                <a:cs typeface="Courier New" panose="02070309020205020404" pitchFamily="49" charset="0"/>
-              </a:rPr>
-              <a:t> element</a:t>
-            </a:r>
-          </a:p>
-          <a:p>
-            <a:r>
-              <a:rPr lang="en-US" dirty="0">
-                <a:cs typeface="Courier New" panose="02070309020205020404" pitchFamily="49" charset="0"/>
-              </a:rPr>
-              <a:t>Also, can access by giving custom names to values!</a:t>
-            </a:r>
-          </a:p>
-          <a:p>
-            <a:pPr lvl="1"/>
-            <a:r>
-              <a:rPr lang="en-US" dirty="0">
-                <a:latin typeface="Courier New" panose="02070309020205020404" pitchFamily="49" charset="0"/>
-                <a:cs typeface="Courier New" panose="02070309020205020404" pitchFamily="49" charset="0"/>
-              </a:rPr>
-              <a:t>ages &lt;- list(16, 17); names(ages) &lt;- c(“</a:t>
-            </a:r>
-            <a:r>
-              <a:rPr lang="en-US" dirty="0" err="1">
-                <a:latin typeface="Courier New" panose="02070309020205020404" pitchFamily="49" charset="0"/>
-                <a:cs typeface="Courier New" panose="02070309020205020404" pitchFamily="49" charset="0"/>
-              </a:rPr>
-              <a:t>steve</a:t>
-            </a:r>
-            <a:r>
-              <a:rPr lang="en-US" dirty="0">
-                <a:latin typeface="Courier New" panose="02070309020205020404" pitchFamily="49" charset="0"/>
-                <a:cs typeface="Courier New" panose="02070309020205020404" pitchFamily="49" charset="0"/>
-              </a:rPr>
-              <a:t>”, “tony”)</a:t>
-            </a:r>
-          </a:p>
-          <a:p>
-            <a:pPr lvl="1"/>
-            <a:r>
-              <a:rPr lang="en-US" dirty="0" err="1">
-                <a:latin typeface="Courier New" panose="02070309020205020404" pitchFamily="49" charset="0"/>
-                <a:cs typeface="Courier New" panose="02070309020205020404" pitchFamily="49" charset="0"/>
-              </a:rPr>
-              <a:t>ages$steve</a:t>
-            </a:r>
-            <a:endParaRPr lang="en-US" dirty="0">
-              <a:latin typeface="Courier New" panose="02070309020205020404" pitchFamily="49" charset="0"/>
-              <a:cs typeface="Courier New" panose="02070309020205020404" pitchFamily="49" charset="0"/>
-            </a:endParaRPr>
-          </a:p>
-          <a:p>
-            <a:endParaRPr lang="en-US" dirty="0"/>
-          </a:p>
-        </p:txBody>
-      </p:sp>
-      <p:sp>
-        <p:nvSpPr>
-          <p:cNvPr id="4" name="Date Placeholder 3"/>
-          <p:cNvSpPr>
-            <a:spLocks noGrp="1"/>
-          </p:cNvSpPr>
-          <p:nvPr>
-            <p:ph type="dt" sz="half" idx="10"/>
-          </p:nvPr>
-        </p:nvSpPr>
-        <p:spPr/>
-        <p:txBody>
-          <a:bodyPr/>
-          <a:lstStyle/>
-          <a:p>
-            <a:fld id="{8AAE40A0-A7D8-4DC3-BC9E-BADA32DA2004}" type="datetime4">
-              <a:rPr lang="en-US" smtClean="0"/>
-              <a:t>June 29, 2019</a:t>
-            </a:fld>
-            <a:endParaRPr lang="en-US" dirty="0"/>
-          </a:p>
-        </p:txBody>
-      </p:sp>
-      <p:sp>
-        <p:nvSpPr>
-          <p:cNvPr id="5" name="Footer Placeholder 4"/>
-          <p:cNvSpPr>
-            <a:spLocks noGrp="1"/>
-          </p:cNvSpPr>
-          <p:nvPr>
-            <p:ph type="ftr" sz="quarter" idx="11"/>
-          </p:nvPr>
-        </p:nvSpPr>
-        <p:spPr/>
-        <p:txBody>
-          <a:bodyPr/>
-          <a:lstStyle/>
-          <a:p>
-            <a:r>
-              <a:rPr lang="en-US"/>
-              <a:t>Digital Scholarship Services </a:t>
-            </a:r>
-            <a:r>
-              <a:rPr lang="en-US">
-                <a:solidFill>
-                  <a:schemeClr val="accent1">
-                    <a:lumMod val="50000"/>
-                  </a:schemeClr>
-                </a:solidFill>
-              </a:rPr>
-              <a:t>| Email</a:t>
-            </a:r>
-            <a:r>
-              <a:rPr lang="en-US"/>
-              <a:t> cf24@rice.edu </a:t>
-            </a:r>
-            <a:r>
-              <a:rPr lang="en-US">
-                <a:solidFill>
-                  <a:schemeClr val="accent1">
-                    <a:lumMod val="50000"/>
-                  </a:schemeClr>
-                </a:solidFill>
-              </a:rPr>
-              <a:t>|</a:t>
-            </a:r>
-            <a:r>
-              <a:rPr lang="en-US"/>
-              <a:t> library.rice.edu/dss</a:t>
-            </a:r>
-            <a:endParaRPr lang="en-US" dirty="0"/>
-          </a:p>
-        </p:txBody>
-      </p:sp>
-      <p:sp>
-        <p:nvSpPr>
-          <p:cNvPr id="6" name="Slide Number Placeholder 5"/>
-          <p:cNvSpPr>
-            <a:spLocks noGrp="1"/>
-          </p:cNvSpPr>
-          <p:nvPr>
-            <p:ph type="sldNum" sz="quarter" idx="12"/>
-          </p:nvPr>
-        </p:nvSpPr>
-        <p:spPr/>
-        <p:txBody>
-          <a:bodyPr/>
-          <a:lstStyle/>
-          <a:p>
-            <a:fld id="{D57F1E4F-1CFF-5643-939E-02111984F565}" type="slidenum">
-              <a:rPr lang="en-US" smtClean="0"/>
-              <a:t>16</a:t>
             </a:fld>
             <a:endParaRPr lang="en-US" dirty="0"/>
           </a:p>
@@ -5583,7 +5326,7 @@
 </p:sld>
 </file>
 
-<file path=ppt/slides/slide17.xml><?xml version="1.0" encoding="utf-8"?>
+<file path=ppt/slides/slide16.xml><?xml version="1.0" encoding="utf-8"?>
 <p:sld xmlns:a="http://schemas.openxmlformats.org/drawingml/2006/main" xmlns:r="http://schemas.openxmlformats.org/officeDocument/2006/relationships" xmlns:p="http://schemas.openxmlformats.org/presentationml/2006/main">
   <p:cSld>
     <p:spTree>
@@ -5897,7 +5640,7 @@
           <a:p>
             <a:fld id="{D57F1E4F-1CFF-5643-939E-02111984F565}" type="slidenum">
               <a:rPr lang="en-US" smtClean="0"/>
-              <a:t>17</a:t>
+              <a:t>16</a:t>
             </a:fld>
             <a:endParaRPr lang="en-US" dirty="0"/>
           </a:p>
@@ -5907,6 +5650,318 @@
     <p:extLst>
       <p:ext uri="{BB962C8B-B14F-4D97-AF65-F5344CB8AC3E}">
         <p14:creationId xmlns:p14="http://schemas.microsoft.com/office/powerpoint/2010/main" val="1867989177"/>
+      </p:ext>
+    </p:extLst>
+  </p:cSld>
+  <p:clrMapOvr>
+    <a:masterClrMapping/>
+  </p:clrMapOvr>
+</p:sld>
+</file>
+
+<file path=ppt/slides/slide17.xml><?xml version="1.0" encoding="utf-8"?>
+<p:sld xmlns:a="http://schemas.openxmlformats.org/drawingml/2006/main" xmlns:r="http://schemas.openxmlformats.org/officeDocument/2006/relationships" xmlns:p="http://schemas.openxmlformats.org/presentationml/2006/main">
+  <p:cSld>
+    <p:spTree>
+      <p:nvGrpSpPr>
+        <p:cNvPr id="1" name=""/>
+        <p:cNvGrpSpPr/>
+        <p:nvPr/>
+      </p:nvGrpSpPr>
+      <p:grpSpPr>
+        <a:xfrm>
+          <a:off x="0" y="0"/>
+          <a:ext cx="0" cy="0"/>
+          <a:chOff x="0" y="0"/>
+          <a:chExt cx="0" cy="0"/>
+        </a:xfrm>
+      </p:grpSpPr>
+      <p:sp>
+        <p:nvSpPr>
+          <p:cNvPr id="7" name="Title 6"/>
+          <p:cNvSpPr>
+            <a:spLocks noGrp="1"/>
+          </p:cNvSpPr>
+          <p:nvPr>
+            <p:ph type="title"/>
+          </p:nvPr>
+        </p:nvSpPr>
+        <p:spPr/>
+        <p:txBody>
+          <a:bodyPr/>
+          <a:lstStyle/>
+          <a:p>
+            <a:r>
+              <a:rPr lang="en-US" dirty="0"/>
+              <a:t>ACCESSING MATRICES</a:t>
+            </a:r>
+          </a:p>
+        </p:txBody>
+      </p:sp>
+      <p:sp>
+        <p:nvSpPr>
+          <p:cNvPr id="8" name="Content Placeholder 7"/>
+          <p:cNvSpPr>
+            <a:spLocks noGrp="1"/>
+          </p:cNvSpPr>
+          <p:nvPr>
+            <p:ph idx="1"/>
+          </p:nvPr>
+        </p:nvSpPr>
+        <p:spPr/>
+        <p:txBody>
+          <a:bodyPr>
+            <a:normAutofit fontScale="92500" lnSpcReduction="10000"/>
+          </a:bodyPr>
+          <a:lstStyle/>
+          <a:p>
+            <a:r>
+              <a:rPr lang="en-US" dirty="0"/>
+              <a:t>Given matrix </a:t>
+            </a:r>
+            <a:r>
+              <a:rPr lang="en-US" dirty="0">
+                <a:latin typeface="Courier New" panose="02070309020205020404" pitchFamily="49" charset="0"/>
+                <a:cs typeface="Courier New" panose="02070309020205020404" pitchFamily="49" charset="0"/>
+              </a:rPr>
+              <a:t>mat</a:t>
+            </a:r>
+          </a:p>
+          <a:p>
+            <a:pPr lvl="1"/>
+            <a:r>
+              <a:rPr lang="en-US" dirty="0"/>
+              <a:t>Access one value:</a:t>
+            </a:r>
+          </a:p>
+          <a:p>
+            <a:pPr lvl="2"/>
+            <a:r>
+              <a:rPr lang="en-US" sz="2800" dirty="0">
+                <a:latin typeface="Courier New" panose="02070309020205020404" pitchFamily="49" charset="0"/>
+                <a:cs typeface="Courier New" panose="02070309020205020404" pitchFamily="49" charset="0"/>
+              </a:rPr>
+              <a:t>mat[3,4]: </a:t>
+            </a:r>
+            <a:r>
+              <a:rPr lang="en-US" dirty="0"/>
+              <a:t>element in 3</a:t>
+            </a:r>
+            <a:r>
+              <a:rPr lang="en-US" baseline="30000" dirty="0"/>
+              <a:t>rd</a:t>
+            </a:r>
+            <a:r>
+              <a:rPr lang="en-US" dirty="0"/>
+              <a:t> row, 4</a:t>
+            </a:r>
+            <a:r>
+              <a:rPr lang="en-US" baseline="30000" dirty="0"/>
+              <a:t>th</a:t>
+            </a:r>
+            <a:r>
+              <a:rPr lang="en-US" dirty="0"/>
+              <a:t> column</a:t>
+            </a:r>
+          </a:p>
+          <a:p>
+            <a:pPr lvl="1"/>
+            <a:r>
+              <a:rPr lang="en-US" dirty="0"/>
+              <a:t>Access a column:</a:t>
+            </a:r>
+          </a:p>
+          <a:p>
+            <a:pPr lvl="2"/>
+            <a:r>
+              <a:rPr lang="en-US" sz="2800" dirty="0">
+                <a:latin typeface="Courier New" panose="02070309020205020404" pitchFamily="49" charset="0"/>
+                <a:cs typeface="Courier New" panose="02070309020205020404" pitchFamily="49" charset="0"/>
+              </a:rPr>
+              <a:t>mat[,3 ]: </a:t>
+            </a:r>
+            <a:r>
+              <a:rPr lang="en-US" dirty="0"/>
+              <a:t>3</a:t>
+            </a:r>
+            <a:r>
+              <a:rPr lang="en-US" baseline="30000" dirty="0"/>
+              <a:t>rd</a:t>
+            </a:r>
+            <a:r>
+              <a:rPr lang="en-US" dirty="0"/>
+              <a:t> column</a:t>
+            </a:r>
+          </a:p>
+          <a:p>
+            <a:pPr lvl="1"/>
+            <a:r>
+              <a:rPr lang="en-US" dirty="0"/>
+              <a:t>Access a row:</a:t>
+            </a:r>
+          </a:p>
+          <a:p>
+            <a:pPr lvl="2"/>
+            <a:r>
+              <a:rPr lang="en-US" sz="2800" dirty="0">
+                <a:latin typeface="Courier New" panose="02070309020205020404" pitchFamily="49" charset="0"/>
+                <a:cs typeface="Courier New" panose="02070309020205020404" pitchFamily="49" charset="0"/>
+              </a:rPr>
+              <a:t>mat[3,]: </a:t>
+            </a:r>
+            <a:r>
+              <a:rPr lang="en-US" dirty="0"/>
+              <a:t>3</a:t>
+            </a:r>
+            <a:r>
+              <a:rPr lang="en-US" baseline="30000" dirty="0"/>
+              <a:t>rd</a:t>
+            </a:r>
+            <a:r>
+              <a:rPr lang="en-US" dirty="0"/>
+              <a:t> row</a:t>
+            </a:r>
+          </a:p>
+          <a:p>
+            <a:pPr lvl="1"/>
+            <a:r>
+              <a:rPr lang="en-US" dirty="0"/>
+              <a:t>Access a range of rows or columns:</a:t>
+            </a:r>
+          </a:p>
+          <a:p>
+            <a:pPr lvl="2"/>
+            <a:r>
+              <a:rPr lang="en-US" sz="2800" dirty="0">
+                <a:latin typeface="Courier New" panose="02070309020205020404" pitchFamily="49" charset="0"/>
+                <a:cs typeface="Courier New" panose="02070309020205020404" pitchFamily="49" charset="0"/>
+              </a:rPr>
+              <a:t>mat[1:2, 3:5]</a:t>
+            </a:r>
+          </a:p>
+          <a:p>
+            <a:pPr lvl="3"/>
+            <a:r>
+              <a:rPr lang="en-US" dirty="0"/>
+              <a:t>First 2 rows, columns 3 to 5</a:t>
+            </a:r>
+          </a:p>
+          <a:p>
+            <a:r>
+              <a:rPr lang="en-US" dirty="0"/>
+              <a:t>Can save to these as well using assignment operator</a:t>
+            </a:r>
+          </a:p>
+          <a:p>
+            <a:pPr lvl="1"/>
+            <a:r>
+              <a:rPr lang="en-US" dirty="0"/>
+              <a:t>If using row or column, convert to matrix first!</a:t>
+            </a:r>
+          </a:p>
+        </p:txBody>
+      </p:sp>
+      <p:sp>
+        <p:nvSpPr>
+          <p:cNvPr id="4" name="Date Placeholder 3"/>
+          <p:cNvSpPr>
+            <a:spLocks noGrp="1"/>
+          </p:cNvSpPr>
+          <p:nvPr>
+            <p:ph type="dt" sz="half" idx="10"/>
+          </p:nvPr>
+        </p:nvSpPr>
+        <p:spPr/>
+        <p:txBody>
+          <a:bodyPr/>
+          <a:lstStyle/>
+          <a:p>
+            <a:fld id="{B08FEED8-D7D4-44E9-BFBC-ED06B5996D94}" type="datetime4">
+              <a:rPr lang="en-US" smtClean="0"/>
+              <a:t>June 29, 2019</a:t>
+            </a:fld>
+            <a:endParaRPr lang="en-US" dirty="0"/>
+          </a:p>
+        </p:txBody>
+      </p:sp>
+      <p:sp>
+        <p:nvSpPr>
+          <p:cNvPr id="5" name="Footer Placeholder 4"/>
+          <p:cNvSpPr>
+            <a:spLocks noGrp="1"/>
+          </p:cNvSpPr>
+          <p:nvPr>
+            <p:ph type="ftr" sz="quarter" idx="11"/>
+          </p:nvPr>
+        </p:nvSpPr>
+        <p:spPr/>
+        <p:txBody>
+          <a:bodyPr/>
+          <a:lstStyle/>
+          <a:p>
+            <a:r>
+              <a:rPr lang="en-US"/>
+              <a:t>Digital Scholarship Services </a:t>
+            </a:r>
+            <a:r>
+              <a:rPr lang="en-US">
+                <a:solidFill>
+                  <a:schemeClr val="accent1">
+                    <a:lumMod val="50000"/>
+                  </a:schemeClr>
+                </a:solidFill>
+              </a:rPr>
+              <a:t>| Email</a:t>
+            </a:r>
+            <a:r>
+              <a:rPr lang="en-US"/>
+              <a:t> cf24@rice.edu </a:t>
+            </a:r>
+            <a:r>
+              <a:rPr lang="en-US">
+                <a:solidFill>
+                  <a:schemeClr val="accent1">
+                    <a:lumMod val="50000"/>
+                  </a:schemeClr>
+                </a:solidFill>
+              </a:rPr>
+              <a:t>|</a:t>
+            </a:r>
+            <a:r>
+              <a:rPr lang="en-US"/>
+              <a:t> library.rice.edu/dss</a:t>
+            </a:r>
+            <a:endParaRPr lang="en-US" dirty="0"/>
+          </a:p>
+        </p:txBody>
+      </p:sp>
+      <p:sp>
+        <p:nvSpPr>
+          <p:cNvPr id="6" name="Slide Number Placeholder 5"/>
+          <p:cNvSpPr>
+            <a:spLocks noGrp="1"/>
+          </p:cNvSpPr>
+          <p:nvPr>
+            <p:ph type="sldNum" sz="quarter" idx="12"/>
+          </p:nvPr>
+        </p:nvSpPr>
+        <p:spPr/>
+        <p:txBody>
+          <a:bodyPr/>
+          <a:lstStyle/>
+          <a:p>
+            <a:fld id="{D57F1E4F-1CFF-5643-939E-02111984F565}" type="slidenum">
+              <a:rPr lang="en-US" smtClean="0"/>
+              <a:t>17</a:t>
+            </a:fld>
+            <a:endParaRPr lang="en-US" dirty="0"/>
+          </a:p>
+        </p:txBody>
+      </p:sp>
+    </p:spTree>
+    <p:extLst>
+      <p:ext uri="{BB962C8B-B14F-4D97-AF65-F5344CB8AC3E}">
+        <p14:creationId xmlns:p14="http://schemas.microsoft.com/office/powerpoint/2010/main" val="3909088616"/>
       </p:ext>
     </p:extLst>
   </p:cSld>
@@ -5950,7 +6005,7 @@
           <a:p>
             <a:r>
               <a:rPr lang="en-US" dirty="0"/>
-              <a:t>ACCESSING MATRICES</a:t>
+              <a:t>MATRIX MULTIPLICATION</a:t>
             </a:r>
           </a:p>
         </p:txBody>
@@ -5972,108 +6027,55 @@
           <a:p>
             <a:r>
               <a:rPr lang="en-US" dirty="0"/>
-              <a:t>Given matrix mat</a:t>
+              <a:t>Uses </a:t>
+            </a:r>
+            <a:r>
+              <a:rPr lang="en-US" dirty="0">
+                <a:latin typeface="Courier New" panose="02070309020205020404" pitchFamily="49" charset="0"/>
+                <a:cs typeface="Courier New" panose="02070309020205020404" pitchFamily="49" charset="0"/>
+              </a:rPr>
+              <a:t>%*%</a:t>
+            </a:r>
+            <a:r>
+              <a:rPr lang="en-US" dirty="0"/>
+              <a:t> (don’t use </a:t>
+            </a:r>
+            <a:r>
+              <a:rPr lang="en-US" dirty="0">
+                <a:latin typeface="Courier New" panose="02070309020205020404" pitchFamily="49" charset="0"/>
+                <a:cs typeface="Courier New" panose="02070309020205020404" pitchFamily="49" charset="0"/>
+              </a:rPr>
+              <a:t>*</a:t>
+            </a:r>
+            <a:r>
+              <a:rPr lang="en-US" dirty="0"/>
+              <a:t>!)</a:t>
+            </a:r>
+          </a:p>
+          <a:p>
+            <a:r>
+              <a:rPr lang="en-US" dirty="0"/>
+              <a:t>Requires conformable dimensions</a:t>
             </a:r>
           </a:p>
           <a:p>
             <a:pPr lvl="1"/>
             <a:r>
               <a:rPr lang="en-US" dirty="0"/>
-              <a:t>Access one value:</a:t>
-            </a:r>
-          </a:p>
-          <a:p>
-            <a:pPr lvl="2"/>
-            <a:r>
-              <a:rPr lang="en-US" dirty="0"/>
-              <a:t>mat[3,4]: element in 3</a:t>
-            </a:r>
-            <a:r>
-              <a:rPr lang="en-US" baseline="30000" dirty="0"/>
-              <a:t>rd</a:t>
-            </a:r>
-            <a:r>
-              <a:rPr lang="en-US" dirty="0"/>
-              <a:t> row, 4</a:t>
-            </a:r>
-            <a:r>
-              <a:rPr lang="en-US" baseline="30000" dirty="0"/>
-              <a:t>th</a:t>
-            </a:r>
-            <a:r>
-              <a:rPr lang="en-US" dirty="0"/>
-              <a:t> column</a:t>
+              <a:t>Number of columns in first matrix = number of rows in second matrix</a:t>
+            </a:r>
+          </a:p>
+          <a:p>
+            <a:r>
+              <a:rPr lang="en-US" dirty="0"/>
+              <a:t>Extremely fast!</a:t>
             </a:r>
           </a:p>
           <a:p>
             <a:pPr lvl="1"/>
             <a:r>
               <a:rPr lang="en-US" dirty="0"/>
-              <a:t>Access a column:</a:t>
-            </a:r>
-          </a:p>
-          <a:p>
-            <a:pPr lvl="2"/>
-            <a:r>
-              <a:rPr lang="en-US" dirty="0"/>
-              <a:t>mat[,3 ]: 3</a:t>
-            </a:r>
-            <a:r>
-              <a:rPr lang="en-US" baseline="30000" dirty="0"/>
-              <a:t>rd</a:t>
-            </a:r>
-            <a:r>
-              <a:rPr lang="en-US" dirty="0"/>
-              <a:t> column</a:t>
-            </a:r>
-          </a:p>
-          <a:p>
-            <a:pPr lvl="1"/>
-            <a:r>
-              <a:rPr lang="en-US" dirty="0"/>
-              <a:t>Access a row:</a:t>
-            </a:r>
-          </a:p>
-          <a:p>
-            <a:pPr lvl="2"/>
-            <a:r>
-              <a:rPr lang="en-US" dirty="0"/>
-              <a:t>mat[3,]: 3</a:t>
-            </a:r>
-            <a:r>
-              <a:rPr lang="en-US" baseline="30000" dirty="0"/>
-              <a:t>rd</a:t>
-            </a:r>
-            <a:r>
-              <a:rPr lang="en-US" dirty="0"/>
-              <a:t> row</a:t>
-            </a:r>
-          </a:p>
-          <a:p>
-            <a:pPr lvl="1"/>
-            <a:r>
-              <a:rPr lang="en-US" dirty="0"/>
-              <a:t>Access a range of rows or columns:</a:t>
-            </a:r>
-          </a:p>
-          <a:p>
-            <a:pPr lvl="2"/>
-            <a:r>
-              <a:rPr lang="en-US" dirty="0"/>
-              <a:t>mat[1:2, 3:5]</a:t>
-            </a:r>
-          </a:p>
-          <a:p>
-            <a:pPr lvl="3"/>
-            <a:r>
-              <a:rPr lang="en-US" dirty="0"/>
-              <a:t>First 2 rows, columns 3 to 5</a:t>
-            </a:r>
-          </a:p>
-          <a:p>
-            <a:r>
-              <a:rPr lang="en-US" dirty="0"/>
-              <a:t>Can save to these as well using assignment operator</a:t>
+              <a:t>Optimized libraries</a:t>
             </a:r>
           </a:p>
         </p:txBody>
@@ -6178,7 +6180,7 @@
     </p:spTree>
     <p:extLst>
       <p:ext uri="{BB962C8B-B14F-4D97-AF65-F5344CB8AC3E}">
-        <p14:creationId xmlns:p14="http://schemas.microsoft.com/office/powerpoint/2010/main" val="3909088616"/>
+        <p14:creationId xmlns:p14="http://schemas.microsoft.com/office/powerpoint/2010/main" val="3324607040"/>
       </p:ext>
     </p:extLst>
   </p:cSld>
@@ -6222,7 +6224,7 @@
           <a:p>
             <a:r>
               <a:rPr lang="en-US" dirty="0"/>
-              <a:t>MATRIX MULTIPLICATION</a:t>
+              <a:t>FACTORS</a:t>
             </a:r>
           </a:p>
         </p:txBody>
@@ -6239,39 +6241,88 @@
         </p:nvSpPr>
         <p:spPr/>
         <p:txBody>
-          <a:bodyPr/>
-          <a:lstStyle/>
-          <a:p>
-            <a:r>
-              <a:rPr lang="en-US" dirty="0"/>
-              <a:t>Uses %*% (don’t use *!)</a:t>
-            </a:r>
-          </a:p>
-          <a:p>
-            <a:r>
-              <a:rPr lang="en-US" dirty="0"/>
-              <a:t>Requires conformable dimensions</a:t>
+          <a:bodyPr>
+            <a:normAutofit lnSpcReduction="10000"/>
+          </a:bodyPr>
+          <a:lstStyle/>
+          <a:p>
+            <a:r>
+              <a:rPr lang="en-US" dirty="0"/>
+              <a:t>Categorical data</a:t>
             </a:r>
           </a:p>
           <a:p>
             <a:pPr lvl="1"/>
             <a:r>
               <a:rPr lang="en-US" dirty="0"/>
-              <a:t>Number of columns in first matrix = number of rows in second matrix</a:t>
-            </a:r>
-          </a:p>
-          <a:p>
-            <a:r>
-              <a:rPr lang="en-US" dirty="0"/>
-              <a:t>Extremely fast!</a:t>
+              <a:t>Only a few possible values</a:t>
             </a:r>
           </a:p>
           <a:p>
             <a:pPr lvl="1"/>
             <a:r>
               <a:rPr lang="en-US" dirty="0"/>
-              <a:t>Optimized libraries</a:t>
-            </a:r>
+              <a:t>Example: US States</a:t>
+            </a:r>
+          </a:p>
+          <a:p>
+            <a:r>
+              <a:rPr lang="en-US" dirty="0"/>
+              <a:t>Create a factor with </a:t>
+            </a:r>
+            <a:r>
+              <a:rPr lang="en-US" dirty="0">
+                <a:latin typeface="Courier New" panose="02070309020205020404" pitchFamily="49" charset="0"/>
+                <a:cs typeface="Courier New" panose="02070309020205020404" pitchFamily="49" charset="0"/>
+              </a:rPr>
+              <a:t>factor(c(...), levels=c(...))</a:t>
+            </a:r>
+          </a:p>
+          <a:p>
+            <a:r>
+              <a:rPr lang="en-US" dirty="0">
+                <a:cs typeface="Courier New" panose="02070309020205020404" pitchFamily="49" charset="0"/>
+              </a:rPr>
+              <a:t>First argument: vector </a:t>
+            </a:r>
+          </a:p>
+          <a:p>
+            <a:r>
+              <a:rPr lang="en-US" dirty="0">
+                <a:cs typeface="Courier New" panose="02070309020205020404" pitchFamily="49" charset="0"/>
+              </a:rPr>
+              <a:t>Levels: all possible values</a:t>
+            </a:r>
+          </a:p>
+          <a:p>
+            <a:pPr lvl="1"/>
+            <a:r>
+              <a:rPr lang="en-US" dirty="0">
+                <a:cs typeface="Courier New" panose="02070309020205020404" pitchFamily="49" charset="0"/>
+              </a:rPr>
+              <a:t>If not provided, factor will assume you have provided all possibilities</a:t>
+            </a:r>
+          </a:p>
+          <a:p>
+            <a:r>
+              <a:rPr lang="en-US" dirty="0">
+                <a:cs typeface="Courier New" panose="02070309020205020404" pitchFamily="49" charset="0"/>
+              </a:rPr>
+              <a:t>e.g. </a:t>
+            </a:r>
+            <a:r>
+              <a:rPr lang="en-US" dirty="0">
+                <a:latin typeface="Courier New" panose="02070309020205020404" pitchFamily="49" charset="0"/>
+                <a:cs typeface="Courier New" panose="02070309020205020404" pitchFamily="49" charset="0"/>
+              </a:rPr>
+              <a:t>factor(c(“Grad Student”, “Grad Student”, “Staff”), levels=c(“Grad Student”, “Staff”, “Faculty”))</a:t>
+            </a:r>
+          </a:p>
+          <a:p>
+            <a:pPr marL="0" indent="0">
+              <a:buNone/>
+            </a:pPr>
+            <a:endParaRPr lang="en-US" dirty="0"/>
           </a:p>
         </p:txBody>
       </p:sp>
@@ -6375,7 +6426,7 @@
     </p:spTree>
     <p:extLst>
       <p:ext uri="{BB962C8B-B14F-4D97-AF65-F5344CB8AC3E}">
-        <p14:creationId xmlns:p14="http://schemas.microsoft.com/office/powerpoint/2010/main" val="3324607040"/>
+        <p14:creationId xmlns:p14="http://schemas.microsoft.com/office/powerpoint/2010/main" val="2100250050"/>
       </p:ext>
     </p:extLst>
   </p:cSld>
@@ -6588,7 +6639,7 @@
           <a:p>
             <a:r>
               <a:rPr lang="en-US" dirty="0"/>
-              <a:t>FACTORS</a:t>
+              <a:t>DATA FRAME</a:t>
             </a:r>
           </a:p>
         </p:txBody>
@@ -6605,88 +6656,74 @@
         </p:nvSpPr>
         <p:spPr/>
         <p:txBody>
-          <a:bodyPr>
-            <a:normAutofit lnSpcReduction="10000"/>
-          </a:bodyPr>
-          <a:lstStyle/>
-          <a:p>
-            <a:r>
-              <a:rPr lang="en-US" dirty="0"/>
-              <a:t>Categorical data</a:t>
+          <a:bodyPr/>
+          <a:lstStyle/>
+          <a:p>
+            <a:r>
+              <a:rPr lang="en-US" dirty="0"/>
+              <a:t>The quintessential R data type</a:t>
+            </a:r>
+          </a:p>
+          <a:p>
+            <a:r>
+              <a:rPr lang="en-US" dirty="0"/>
+              <a:t>Extremely flexible and powerful</a:t>
+            </a:r>
+          </a:p>
+          <a:p>
+            <a:r>
+              <a:rPr lang="en-US" dirty="0"/>
+              <a:t>Structure</a:t>
             </a:r>
           </a:p>
           <a:p>
             <a:pPr lvl="1"/>
             <a:r>
               <a:rPr lang="en-US" dirty="0"/>
-              <a:t>Only a few possible values</a:t>
+              <a:t>Column: a variable</a:t>
             </a:r>
           </a:p>
           <a:p>
             <a:pPr lvl="1"/>
             <a:r>
               <a:rPr lang="en-US" dirty="0"/>
-              <a:t>Example: US States</a:t>
-            </a:r>
-          </a:p>
-          <a:p>
-            <a:r>
-              <a:rPr lang="en-US" dirty="0"/>
-              <a:t>Create a factor with </a:t>
+              <a:t>Row: an observation</a:t>
+            </a:r>
+          </a:p>
+          <a:p>
+            <a:r>
+              <a:rPr lang="en-US" dirty="0"/>
+              <a:t>Give data as columns.</a:t>
+            </a:r>
+          </a:p>
+          <a:p>
+            <a:r>
+              <a:rPr lang="en-US" dirty="0"/>
+              <a:t>Example: </a:t>
+            </a:r>
+            <a:r>
+              <a:rPr lang="en-US" dirty="0" err="1">
+                <a:latin typeface="Courier New" panose="02070309020205020404" pitchFamily="49" charset="0"/>
+                <a:cs typeface="Courier New" panose="02070309020205020404" pitchFamily="49" charset="0"/>
+              </a:rPr>
+              <a:t>data.frame</a:t>
             </a:r>
             <a:r>
               <a:rPr lang="en-US" dirty="0">
                 <a:latin typeface="Courier New" panose="02070309020205020404" pitchFamily="49" charset="0"/>
                 <a:cs typeface="Courier New" panose="02070309020205020404" pitchFamily="49" charset="0"/>
               </a:rPr>
-              <a:t>factor(c(...), levels=c(...))</a:t>
-            </a:r>
-          </a:p>
-          <a:p>
+              <a:t>(name=c(“John”, “Molly”), age=c(15,17))</a:t>
+            </a:r>
+          </a:p>
+          <a:p>
+            <a:pPr lvl="1"/>
             <a:r>
               <a:rPr lang="en-US" dirty="0">
                 <a:cs typeface="Courier New" panose="02070309020205020404" pitchFamily="49" charset="0"/>
               </a:rPr>
-              <a:t>First argument: vector </a:t>
-            </a:r>
-          </a:p>
-          <a:p>
-            <a:r>
-              <a:rPr lang="en-US" dirty="0">
-                <a:cs typeface="Courier New" panose="02070309020205020404" pitchFamily="49" charset="0"/>
-              </a:rPr>
-              <a:t>Levels: all possible values</a:t>
-            </a:r>
-          </a:p>
-          <a:p>
-            <a:pPr lvl="1"/>
-            <a:r>
-              <a:rPr lang="en-US" dirty="0">
-                <a:cs typeface="Courier New" panose="02070309020205020404" pitchFamily="49" charset="0"/>
-              </a:rPr>
-              <a:t>If not provided, factor will assume you have provided all possibilities</a:t>
-            </a:r>
-          </a:p>
-          <a:p>
-            <a:r>
-              <a:rPr lang="en-US" dirty="0">
-                <a:cs typeface="Courier New" panose="02070309020205020404" pitchFamily="49" charset="0"/>
-              </a:rPr>
-              <a:t>e.g. </a:t>
-            </a:r>
-            <a:r>
-              <a:rPr lang="en-US" dirty="0">
-                <a:latin typeface="Courier New" panose="02070309020205020404" pitchFamily="49" charset="0"/>
-                <a:cs typeface="Courier New" panose="02070309020205020404" pitchFamily="49" charset="0"/>
-              </a:rPr>
-              <a:t>factor(c(“Grad Student”, “Grad Student”, “Staff”), levels=c(“Grad Student”, “Staff”, “Faculty”))</a:t>
-            </a:r>
-          </a:p>
-          <a:p>
-            <a:pPr marL="0" indent="0">
-              <a:buNone/>
-            </a:pPr>
-            <a:endParaRPr lang="en-US" dirty="0"/>
+              <a:t>John is 15, Molly is 17</a:t>
+            </a:r>
           </a:p>
         </p:txBody>
       </p:sp>
@@ -6790,7 +6827,7 @@
     </p:spTree>
     <p:extLst>
       <p:ext uri="{BB962C8B-B14F-4D97-AF65-F5344CB8AC3E}">
-        <p14:creationId xmlns:p14="http://schemas.microsoft.com/office/powerpoint/2010/main" val="2100250050"/>
+        <p14:creationId xmlns:p14="http://schemas.microsoft.com/office/powerpoint/2010/main" val="349333892"/>
       </p:ext>
     </p:extLst>
   </p:cSld>
@@ -6834,7 +6871,7 @@
           <a:p>
             <a:r>
               <a:rPr lang="en-US" dirty="0"/>
-              <a:t>DATA FRAME</a:t>
+              <a:t>EXAMINING DATA FRAMES</a:t>
             </a:r>
           </a:p>
         </p:txBody>
@@ -6856,68 +6893,71 @@
           <a:p>
             <a:r>
               <a:rPr lang="en-US" dirty="0"/>
-              <a:t>The quintessential R data type</a:t>
-            </a:r>
-          </a:p>
-          <a:p>
-            <a:r>
-              <a:rPr lang="en-US" dirty="0"/>
-              <a:t>Extremely flexible and powerful</a:t>
-            </a:r>
-          </a:p>
-          <a:p>
-            <a:r>
-              <a:rPr lang="en-US" dirty="0"/>
-              <a:t>Structure</a:t>
+              <a:t>Data frames are frequently huge. Use the following commands to take a look without printing out thousands of lines:</a:t>
             </a:r>
           </a:p>
           <a:p>
             <a:pPr lvl="1"/>
             <a:r>
-              <a:rPr lang="en-US" dirty="0"/>
-              <a:t>Column: a variable</a:t>
+              <a:rPr lang="en-US" dirty="0">
+                <a:latin typeface="Courier New" panose="02070309020205020404" pitchFamily="49" charset="0"/>
+                <a:cs typeface="Courier New" panose="02070309020205020404" pitchFamily="49" charset="0"/>
+              </a:rPr>
+              <a:t>head(df)</a:t>
+            </a:r>
+          </a:p>
+          <a:p>
+            <a:pPr lvl="2"/>
+            <a:r>
+              <a:rPr lang="en-US" dirty="0">
+                <a:cs typeface="Courier New" panose="02070309020205020404" pitchFamily="49" charset="0"/>
+              </a:rPr>
+              <a:t>Take a look at the first few entries</a:t>
             </a:r>
           </a:p>
           <a:p>
             <a:pPr lvl="1"/>
             <a:r>
-              <a:rPr lang="en-US" dirty="0"/>
-              <a:t>Row: an observation</a:t>
-            </a:r>
-          </a:p>
-          <a:p>
-            <a:r>
-              <a:rPr lang="en-US" dirty="0"/>
-              <a:t>Give data as columns.</a:t>
-            </a:r>
-          </a:p>
-          <a:p>
-            <a:r>
-              <a:rPr lang="en-US" dirty="0"/>
-              <a:t>Example: </a:t>
-            </a:r>
+              <a:rPr lang="en-US" dirty="0">
+                <a:latin typeface="Courier New" panose="02070309020205020404" pitchFamily="49" charset="0"/>
+                <a:cs typeface="Courier New" panose="02070309020205020404" pitchFamily="49" charset="0"/>
+              </a:rPr>
+              <a:t>tail(df)</a:t>
+            </a:r>
+          </a:p>
+          <a:p>
+            <a:pPr lvl="2"/>
+            <a:r>
+              <a:rPr lang="en-US" dirty="0">
+                <a:cs typeface="Courier New" panose="02070309020205020404" pitchFamily="49" charset="0"/>
+              </a:rPr>
+              <a:t>Take a look at the last few entries</a:t>
+            </a:r>
+          </a:p>
+          <a:p>
+            <a:pPr lvl="1"/>
             <a:r>
               <a:rPr lang="en-US" dirty="0" err="1">
                 <a:latin typeface="Courier New" panose="02070309020205020404" pitchFamily="49" charset="0"/>
                 <a:cs typeface="Courier New" panose="02070309020205020404" pitchFamily="49" charset="0"/>
               </a:rPr>
-              <a:t>data.frame</a:t>
+              <a:t>colnames</a:t>
             </a:r>
             <a:r>
               <a:rPr lang="en-US" dirty="0">
                 <a:latin typeface="Courier New" panose="02070309020205020404" pitchFamily="49" charset="0"/>
                 <a:cs typeface="Courier New" panose="02070309020205020404" pitchFamily="49" charset="0"/>
               </a:rPr>
-              <a:t>(name=c(“John”, “Molly”), age=c(15,17))</a:t>
-            </a:r>
-          </a:p>
-          <a:p>
-            <a:pPr lvl="1"/>
+              <a:t>(df)</a:t>
+            </a:r>
+          </a:p>
+          <a:p>
+            <a:pPr lvl="2"/>
             <a:r>
               <a:rPr lang="en-US" dirty="0">
                 <a:cs typeface="Courier New" panose="02070309020205020404" pitchFamily="49" charset="0"/>
               </a:rPr>
-              <a:t>John is 15, Molly is 17</a:t>
+              <a:t>Take a look at the available variables</a:t>
             </a:r>
           </a:p>
         </p:txBody>
@@ -6939,7 +6979,7 @@
           <a:p>
             <a:fld id="{B08FEED8-D7D4-44E9-BFBC-ED06B5996D94}" type="datetime4">
               <a:rPr lang="en-US" smtClean="0"/>
-              <a:t>June 29, 2019</a:t>
+              <a:t>June 30, 2019</a:t>
             </a:fld>
             <a:endParaRPr lang="en-US" dirty="0"/>
           </a:p>
@@ -7022,7 +7062,7 @@
     </p:spTree>
     <p:extLst>
       <p:ext uri="{BB962C8B-B14F-4D97-AF65-F5344CB8AC3E}">
-        <p14:creationId xmlns:p14="http://schemas.microsoft.com/office/powerpoint/2010/main" val="349333892"/>
+        <p14:creationId xmlns:p14="http://schemas.microsoft.com/office/powerpoint/2010/main" val="2051851346"/>
       </p:ext>
     </p:extLst>
   </p:cSld>
@@ -7051,13 +7091,7 @@
       </p:grpSpPr>
       <p:sp>
         <p:nvSpPr>
-          <p:cNvPr id="7" name="Title 6">
-            <a:extLst>
-              <a:ext uri="{FF2B5EF4-FFF2-40B4-BE49-F238E27FC236}">
-                <a16:creationId xmlns:a16="http://schemas.microsoft.com/office/drawing/2014/main" id="{184E2338-1026-45D4-9455-B21A88F18B28}"/>
-              </a:ext>
-            </a:extLst>
-          </p:cNvPr>
+          <p:cNvPr id="7" name="Title 6"/>
           <p:cNvSpPr>
             <a:spLocks noGrp="1"/>
           </p:cNvSpPr>
@@ -7072,55 +7106,56 @@
           <a:p>
             <a:r>
               <a:rPr lang="en-US" dirty="0"/>
-              <a:t>READING AND </a:t>
-            </a:r>
-            <a:br>
-              <a:rPr lang="en-US" dirty="0"/>
-            </a:br>
-            <a:r>
-              <a:rPr lang="en-US" dirty="0"/>
-              <a:t>WRITING DATA</a:t>
-            </a:r>
-          </a:p>
-        </p:txBody>
-      </p:sp>
-      <p:sp>
-        <p:nvSpPr>
-          <p:cNvPr id="8" name="Text Placeholder 7">
-            <a:extLst>
-              <a:ext uri="{FF2B5EF4-FFF2-40B4-BE49-F238E27FC236}">
-                <a16:creationId xmlns:a16="http://schemas.microsoft.com/office/drawing/2014/main" id="{DB42CCAB-C8E2-48A8-A9DF-EB0383A8B33C}"/>
-              </a:ext>
-            </a:extLst>
-          </p:cNvPr>
-          <p:cNvSpPr>
-            <a:spLocks noGrp="1"/>
-          </p:cNvSpPr>
-          <p:nvPr>
-            <p:ph type="body" idx="1"/>
-          </p:nvPr>
-        </p:nvSpPr>
-        <p:spPr/>
-        <p:txBody>
-          <a:bodyPr/>
-          <a:lstStyle/>
-          <a:p>
-            <a:r>
-              <a:rPr lang="en-US" dirty="0"/>
-              <a:t>Excel, Comma-Separated and Tab-Separated Values, and more!</a:t>
-            </a:r>
-          </a:p>
-        </p:txBody>
-      </p:sp>
-      <p:sp>
-        <p:nvSpPr>
-          <p:cNvPr id="4" name="Date Placeholder 3">
-            <a:extLst>
-              <a:ext uri="{FF2B5EF4-FFF2-40B4-BE49-F238E27FC236}">
-                <a16:creationId xmlns:a16="http://schemas.microsoft.com/office/drawing/2014/main" id="{1CA94ACB-62A5-4F09-8C21-F0CE9BFB1606}"/>
-              </a:ext>
-            </a:extLst>
-          </p:cNvPr>
+              <a:t>A NOTE ABOUT FUNCTIONS</a:t>
+            </a:r>
+          </a:p>
+        </p:txBody>
+      </p:sp>
+      <p:sp>
+        <p:nvSpPr>
+          <p:cNvPr id="8" name="Content Placeholder 7"/>
+          <p:cNvSpPr>
+            <a:spLocks noGrp="1"/>
+          </p:cNvSpPr>
+          <p:nvPr>
+            <p:ph idx="1"/>
+          </p:nvPr>
+        </p:nvSpPr>
+        <p:spPr/>
+        <p:txBody>
+          <a:bodyPr/>
+          <a:lstStyle/>
+          <a:p>
+            <a:r>
+              <a:rPr lang="en-US" dirty="0"/>
+              <a:t>Two types of arguments/parameters to functions:</a:t>
+            </a:r>
+          </a:p>
+          <a:p>
+            <a:pPr lvl="1"/>
+            <a:r>
+              <a:rPr lang="en-US" dirty="0"/>
+              <a:t>Positional: mean(data)</a:t>
+            </a:r>
+          </a:p>
+          <a:p>
+            <a:pPr lvl="1"/>
+            <a:r>
+              <a:rPr lang="en-US" dirty="0"/>
+              <a:t>Keyword: mean(data, NA.RM=TRUE)</a:t>
+            </a:r>
+          </a:p>
+          <a:p>
+            <a:r>
+              <a:rPr lang="en-US" dirty="0"/>
+              <a:t>Functions in R often take optional keyword parameters. Check a function out in R with ?function or help(function) and see if there are any additional arguments that might help make your life easier!</a:t>
+            </a:r>
+          </a:p>
+        </p:txBody>
+      </p:sp>
+      <p:sp>
+        <p:nvSpPr>
+          <p:cNvPr id="4" name="Date Placeholder 3"/>
           <p:cNvSpPr>
             <a:spLocks noGrp="1"/>
           </p:cNvSpPr>
@@ -7133,9 +7168,9 @@
           <a:bodyPr/>
           <a:lstStyle/>
           <a:p>
-            <a:fld id="{8AAE40A0-A7D8-4DC3-BC9E-BADA32DA2004}" type="datetime4">
+            <a:fld id="{B08FEED8-D7D4-44E9-BFBC-ED06B5996D94}" type="datetime4">
               <a:rPr lang="en-US" smtClean="0"/>
-              <a:t>June 29, 2019</a:t>
+              <a:t>June 30, 2019</a:t>
             </a:fld>
             <a:endParaRPr lang="en-US" dirty="0"/>
           </a:p>
@@ -7143,13 +7178,7 @@
       </p:sp>
       <p:sp>
         <p:nvSpPr>
-          <p:cNvPr id="5" name="Footer Placeholder 4">
-            <a:extLst>
-              <a:ext uri="{FF2B5EF4-FFF2-40B4-BE49-F238E27FC236}">
-                <a16:creationId xmlns:a16="http://schemas.microsoft.com/office/drawing/2014/main" id="{D20B02B0-893D-4696-B6F7-A126B8D18E99}"/>
-              </a:ext>
-            </a:extLst>
-          </p:cNvPr>
+          <p:cNvPr id="5" name="Footer Placeholder 4"/>
           <p:cNvSpPr>
             <a:spLocks noGrp="1"/>
           </p:cNvSpPr>
@@ -7200,13 +7229,7 @@
       </p:sp>
       <p:sp>
         <p:nvSpPr>
-          <p:cNvPr id="6" name="Slide Number Placeholder 5">
-            <a:extLst>
-              <a:ext uri="{FF2B5EF4-FFF2-40B4-BE49-F238E27FC236}">
-                <a16:creationId xmlns:a16="http://schemas.microsoft.com/office/drawing/2014/main" id="{1CFDA495-0063-4571-8969-0DD770DB39E0}"/>
-              </a:ext>
-            </a:extLst>
-          </p:cNvPr>
+          <p:cNvPr id="6" name="Slide Number Placeholder 5"/>
           <p:cNvSpPr>
             <a:spLocks noGrp="1"/>
           </p:cNvSpPr>
@@ -7230,7 +7253,7 @@
     </p:spTree>
     <p:extLst>
       <p:ext uri="{BB962C8B-B14F-4D97-AF65-F5344CB8AC3E}">
-        <p14:creationId xmlns:p14="http://schemas.microsoft.com/office/powerpoint/2010/main" val="2581962988"/>
+        <p14:creationId xmlns:p14="http://schemas.microsoft.com/office/powerpoint/2010/main" val="1868989129"/>
       </p:ext>
     </p:extLst>
   </p:cSld>
@@ -7259,7 +7282,13 @@
       </p:grpSpPr>
       <p:sp>
         <p:nvSpPr>
-          <p:cNvPr id="7" name="Title 6"/>
+          <p:cNvPr id="7" name="Title 6">
+            <a:extLst>
+              <a:ext uri="{FF2B5EF4-FFF2-40B4-BE49-F238E27FC236}">
+                <a16:creationId xmlns:a16="http://schemas.microsoft.com/office/drawing/2014/main" id="{184E2338-1026-45D4-9455-B21A88F18B28}"/>
+              </a:ext>
+            </a:extLst>
+          </p:cNvPr>
           <p:cNvSpPr>
             <a:spLocks noGrp="1"/>
           </p:cNvSpPr>
@@ -7274,129 +7303,55 @@
           <a:p>
             <a:r>
               <a:rPr lang="en-US" dirty="0"/>
-              <a:t>COMMON FILE FORMATS</a:t>
-            </a:r>
-          </a:p>
-        </p:txBody>
-      </p:sp>
-      <p:sp>
-        <p:nvSpPr>
-          <p:cNvPr id="8" name="Content Placeholder 7"/>
-          <p:cNvSpPr>
-            <a:spLocks noGrp="1"/>
-          </p:cNvSpPr>
-          <p:nvPr>
-            <p:ph idx="1"/>
-          </p:nvPr>
-        </p:nvSpPr>
-        <p:spPr/>
-        <p:txBody>
-          <a:bodyPr/>
-          <a:lstStyle/>
-          <a:p>
-            <a:r>
-              <a:rPr lang="en-US" dirty="0"/>
-              <a:t>Comma/Tab Separated Values: (.csv, .</a:t>
-            </a:r>
-            <a:r>
-              <a:rPr lang="en-US" dirty="0" err="1"/>
-              <a:t>tsv</a:t>
-            </a:r>
-            <a:r>
-              <a:rPr lang="en-US" dirty="0"/>
-              <a:t>)</a:t>
-            </a:r>
-          </a:p>
-          <a:p>
-            <a:pPr lvl="1"/>
-            <a:r>
-              <a:rPr lang="en-US" dirty="0"/>
-              <a:t>Example:</a:t>
-            </a:r>
-          </a:p>
-          <a:p>
-            <a:pPr lvl="2"/>
-            <a:r>
-              <a:rPr lang="en-US" dirty="0" err="1"/>
-              <a:t>name,age,occupation</a:t>
-            </a:r>
-            <a:r>
-              <a:rPr lang="en-US" dirty="0"/>
-              <a:t> (first line: header)</a:t>
-            </a:r>
-          </a:p>
-          <a:p>
-            <a:pPr lvl="2"/>
-            <a:r>
-              <a:rPr lang="en-US" dirty="0"/>
-              <a:t>tony,23,banker (all other lines: observations)</a:t>
-            </a:r>
-          </a:p>
-          <a:p>
-            <a:r>
-              <a:rPr lang="en-US" dirty="0"/>
-              <a:t>Excel files (.</a:t>
-            </a:r>
-            <a:r>
-              <a:rPr lang="en-US" dirty="0" err="1"/>
-              <a:t>xlsx</a:t>
-            </a:r>
-            <a:r>
-              <a:rPr lang="en-US" dirty="0"/>
-              <a:t>, .</a:t>
-            </a:r>
-            <a:r>
-              <a:rPr lang="en-US" dirty="0" err="1"/>
-              <a:t>xls</a:t>
-            </a:r>
-            <a:r>
-              <a:rPr lang="en-US" dirty="0"/>
-              <a:t>*)</a:t>
-            </a:r>
-          </a:p>
-          <a:p>
-            <a:r>
-              <a:rPr lang="en-US" dirty="0"/>
-              <a:t>JSON (.</a:t>
-            </a:r>
-            <a:r>
-              <a:rPr lang="en-US" dirty="0" err="1"/>
-              <a:t>json</a:t>
-            </a:r>
-            <a:r>
-              <a:rPr lang="en-US" dirty="0"/>
-              <a:t>)</a:t>
-            </a:r>
-          </a:p>
-          <a:p>
-            <a:pPr lvl="1"/>
-            <a:r>
-              <a:rPr lang="en-US" dirty="0"/>
-              <a:t>{“name”: “Tony”, “age”: 23, “occupation:” “banker”}</a:t>
-            </a:r>
-          </a:p>
-          <a:p>
-            <a:r>
-              <a:rPr lang="en-US" dirty="0"/>
-              <a:t>XML (.xml)</a:t>
-            </a:r>
-          </a:p>
-          <a:p>
-            <a:pPr lvl="1"/>
-            <a:r>
-              <a:rPr lang="en-US" dirty="0"/>
-              <a:t>&lt;person&gt; &lt;name&gt;Tony&lt;/name&gt; &lt;age&gt;23&lt;/age&gt; &lt;occupation&gt;banker&lt;/occupation&gt; &lt;/person&gt;</a:t>
-            </a:r>
-          </a:p>
-          <a:p>
-            <a:pPr lvl="1"/>
-            <a:endParaRPr lang="en-US" dirty="0"/>
-          </a:p>
-        </p:txBody>
-      </p:sp>
-      <p:sp>
-        <p:nvSpPr>
-          <p:cNvPr id="4" name="Date Placeholder 3"/>
+              <a:t>READING AND </a:t>
+            </a:r>
+            <a:br>
+              <a:rPr lang="en-US" dirty="0"/>
+            </a:br>
+            <a:r>
+              <a:rPr lang="en-US" dirty="0"/>
+              <a:t>WRITING DATA</a:t>
+            </a:r>
+          </a:p>
+        </p:txBody>
+      </p:sp>
+      <p:sp>
+        <p:nvSpPr>
+          <p:cNvPr id="8" name="Text Placeholder 7">
+            <a:extLst>
+              <a:ext uri="{FF2B5EF4-FFF2-40B4-BE49-F238E27FC236}">
+                <a16:creationId xmlns:a16="http://schemas.microsoft.com/office/drawing/2014/main" id="{DB42CCAB-C8E2-48A8-A9DF-EB0383A8B33C}"/>
+              </a:ext>
+            </a:extLst>
+          </p:cNvPr>
+          <p:cNvSpPr>
+            <a:spLocks noGrp="1"/>
+          </p:cNvSpPr>
+          <p:nvPr>
+            <p:ph type="body" idx="1"/>
+          </p:nvPr>
+        </p:nvSpPr>
+        <p:spPr/>
+        <p:txBody>
+          <a:bodyPr/>
+          <a:lstStyle/>
+          <a:p>
+            <a:r>
+              <a:rPr lang="en-US" dirty="0"/>
+              <a:t>Excel, Comma-Separated and Tab-Separated Values, and more!</a:t>
+            </a:r>
+          </a:p>
+        </p:txBody>
+      </p:sp>
+      <p:sp>
+        <p:nvSpPr>
+          <p:cNvPr id="4" name="Date Placeholder 3">
+            <a:extLst>
+              <a:ext uri="{FF2B5EF4-FFF2-40B4-BE49-F238E27FC236}">
+                <a16:creationId xmlns:a16="http://schemas.microsoft.com/office/drawing/2014/main" id="{1CA94ACB-62A5-4F09-8C21-F0CE9BFB1606}"/>
+              </a:ext>
+            </a:extLst>
+          </p:cNvPr>
           <p:cNvSpPr>
             <a:spLocks noGrp="1"/>
           </p:cNvSpPr>
@@ -7409,7 +7364,7 @@
           <a:bodyPr/>
           <a:lstStyle/>
           <a:p>
-            <a:fld id="{B08FEED8-D7D4-44E9-BFBC-ED06B5996D94}" type="datetime4">
+            <a:fld id="{8AAE40A0-A7D8-4DC3-BC9E-BADA32DA2004}" type="datetime4">
               <a:rPr lang="en-US" smtClean="0"/>
               <a:t>June 29, 2019</a:t>
             </a:fld>
@@ -7419,7 +7374,13 @@
       </p:sp>
       <p:sp>
         <p:nvSpPr>
-          <p:cNvPr id="5" name="Footer Placeholder 4"/>
+          <p:cNvPr id="5" name="Footer Placeholder 4">
+            <a:extLst>
+              <a:ext uri="{FF2B5EF4-FFF2-40B4-BE49-F238E27FC236}">
+                <a16:creationId xmlns:a16="http://schemas.microsoft.com/office/drawing/2014/main" id="{D20B02B0-893D-4696-B6F7-A126B8D18E99}"/>
+              </a:ext>
+            </a:extLst>
+          </p:cNvPr>
           <p:cNvSpPr>
             <a:spLocks noGrp="1"/>
           </p:cNvSpPr>
@@ -7470,7 +7431,13 @@
       </p:sp>
       <p:sp>
         <p:nvSpPr>
-          <p:cNvPr id="6" name="Slide Number Placeholder 5"/>
+          <p:cNvPr id="6" name="Slide Number Placeholder 5">
+            <a:extLst>
+              <a:ext uri="{FF2B5EF4-FFF2-40B4-BE49-F238E27FC236}">
+                <a16:creationId xmlns:a16="http://schemas.microsoft.com/office/drawing/2014/main" id="{1CFDA495-0063-4571-8969-0DD770DB39E0}"/>
+              </a:ext>
+            </a:extLst>
+          </p:cNvPr>
           <p:cNvSpPr>
             <a:spLocks noGrp="1"/>
           </p:cNvSpPr>
@@ -7494,7 +7461,7 @@
     </p:spTree>
     <p:extLst>
       <p:ext uri="{BB962C8B-B14F-4D97-AF65-F5344CB8AC3E}">
-        <p14:creationId xmlns:p14="http://schemas.microsoft.com/office/powerpoint/2010/main" val="3674866452"/>
+        <p14:creationId xmlns:p14="http://schemas.microsoft.com/office/powerpoint/2010/main" val="2581962988"/>
       </p:ext>
     </p:extLst>
   </p:cSld>
@@ -7538,7 +7505,7 @@
           <a:p>
             <a:r>
               <a:rPr lang="en-US" dirty="0"/>
-              <a:t>READING FILE FORMATS</a:t>
+              <a:t>COMMON FILE FORMATS</a:t>
             </a:r>
           </a:p>
         </p:txBody>
@@ -7575,7 +7542,25 @@
             <a:pPr lvl="1"/>
             <a:r>
               <a:rPr lang="en-US" dirty="0"/>
-              <a:t>Read.csv</a:t>
+              <a:t>Example:</a:t>
+            </a:r>
+          </a:p>
+          <a:p>
+            <a:pPr lvl="2"/>
+            <a:r>
+              <a:rPr lang="en-US" dirty="0" err="1"/>
+              <a:t>name,age,occupation</a:t>
+            </a:r>
+            <a:r>
+              <a:rPr lang="en-US" dirty="0"/>
+              <a:t> (first line: header)</a:t>
+            </a:r>
+          </a:p>
+          <a:p>
+            <a:pPr lvl="2"/>
+            <a:r>
+              <a:rPr lang="en-US" dirty="0"/>
+              <a:t>tony,23,banker (all other lines: observations)</a:t>
             </a:r>
           </a:p>
           <a:p>
@@ -7618,7 +7603,7 @@
             <a:pPr lvl="1"/>
             <a:r>
               <a:rPr lang="en-US" dirty="0"/>
-              <a:t>Example</a:t>
+              <a:t>{“name”: “Tony”, “age”: 23, “occupation:” “banker”}</a:t>
             </a:r>
           </a:p>
           <a:p>
@@ -7631,8 +7616,12 @@
             <a:pPr lvl="1"/>
             <a:r>
               <a:rPr lang="en-US" dirty="0"/>
-              <a:t>Example</a:t>
-            </a:r>
+              <a:t>&lt;person&gt; &lt;name&gt;Tony&lt;/name&gt; &lt;age&gt;23&lt;/age&gt; &lt;occupation&gt;banker&lt;/occupation&gt; &lt;/person&gt;</a:t>
+            </a:r>
+          </a:p>
+          <a:p>
+            <a:pPr lvl="1"/>
+            <a:endParaRPr lang="en-US" dirty="0"/>
           </a:p>
         </p:txBody>
       </p:sp>
@@ -7736,7 +7725,7 @@
     </p:spTree>
     <p:extLst>
       <p:ext uri="{BB962C8B-B14F-4D97-AF65-F5344CB8AC3E}">
-        <p14:creationId xmlns:p14="http://schemas.microsoft.com/office/powerpoint/2010/main" val="472407328"/>
+        <p14:creationId xmlns:p14="http://schemas.microsoft.com/office/powerpoint/2010/main" val="3674866452"/>
       </p:ext>
     </p:extLst>
   </p:cSld>
@@ -7780,7 +7769,7 @@
           <a:p>
             <a:r>
               <a:rPr lang="en-US" dirty="0"/>
-              <a:t>WRITING FILE FORMATS</a:t>
+              <a:t>READING FILE FORMATS</a:t>
             </a:r>
           </a:p>
         </p:txBody>
@@ -7817,7 +7806,7 @@
             <a:pPr lvl="1"/>
             <a:r>
               <a:rPr lang="en-US" dirty="0"/>
-              <a:t>Write.csv</a:t>
+              <a:t>Read.csv</a:t>
             </a:r>
           </a:p>
           <a:p>
@@ -7978,7 +7967,7 @@
     </p:spTree>
     <p:extLst>
       <p:ext uri="{BB962C8B-B14F-4D97-AF65-F5344CB8AC3E}">
-        <p14:creationId xmlns:p14="http://schemas.microsoft.com/office/powerpoint/2010/main" val="880888547"/>
+        <p14:creationId xmlns:p14="http://schemas.microsoft.com/office/powerpoint/2010/main" val="472407328"/>
       </p:ext>
     </p:extLst>
   </p:cSld>
@@ -8022,7 +8011,7 @@
           <a:p>
             <a:r>
               <a:rPr lang="en-US" dirty="0"/>
-              <a:t>A WORD OF WARNING ON FACTORS</a:t>
+              <a:t>WRITING FILE FORMATS</a:t>
             </a:r>
           </a:p>
         </p:txBody>
@@ -8044,115 +8033,79 @@
           <a:p>
             <a:r>
               <a:rPr lang="en-US" dirty="0"/>
-              <a:t>R is quick to assume strings you pass in data frames are factors</a:t>
-            </a:r>
-          </a:p>
-          <a:p>
-            <a:r>
-              <a:rPr lang="en-US" dirty="0"/>
-              <a:t>Example: </a:t>
-            </a:r>
-            <a:r>
-              <a:rPr lang="en-US" dirty="0">
-                <a:latin typeface="Courier New" panose="02070309020205020404" pitchFamily="49" charset="0"/>
-                <a:cs typeface="Courier New" panose="02070309020205020404" pitchFamily="49" charset="0"/>
-              </a:rPr>
-              <a:t>df &lt;- </a:t>
-            </a:r>
-            <a:r>
-              <a:rPr lang="en-US" dirty="0" err="1">
-                <a:latin typeface="Courier New" panose="02070309020205020404" pitchFamily="49" charset="0"/>
-                <a:cs typeface="Courier New" panose="02070309020205020404" pitchFamily="49" charset="0"/>
-              </a:rPr>
-              <a:t>data.frame</a:t>
-            </a:r>
-            <a:r>
-              <a:rPr lang="en-US" dirty="0">
-                <a:latin typeface="Courier New" panose="02070309020205020404" pitchFamily="49" charset="0"/>
-                <a:cs typeface="Courier New" panose="02070309020205020404" pitchFamily="49" charset="0"/>
-              </a:rPr>
-              <a:t>(name=c(“John”, “Molly”), age=c(15,17))</a:t>
+              <a:t>Comma/Tab Separated Values: (.csv, .</a:t>
+            </a:r>
+            <a:r>
+              <a:rPr lang="en-US" dirty="0" err="1"/>
+              <a:t>tsv</a:t>
+            </a:r>
+            <a:r>
+              <a:rPr lang="en-US" dirty="0"/>
+              <a:t>)</a:t>
             </a:r>
           </a:p>
           <a:p>
             <a:pPr lvl="1"/>
             <a:r>
               <a:rPr lang="en-US" dirty="0"/>
-              <a:t>Name is a factor!</a:t>
+              <a:t>Write.csv</a:t>
+            </a:r>
+          </a:p>
+          <a:p>
+            <a:r>
+              <a:rPr lang="en-US" dirty="0"/>
+              <a:t>Excel files (.</a:t>
+            </a:r>
+            <a:r>
+              <a:rPr lang="en-US" dirty="0" err="1"/>
+              <a:t>xlsx</a:t>
+            </a:r>
+            <a:r>
+              <a:rPr lang="en-US" dirty="0"/>
+              <a:t>, .</a:t>
+            </a:r>
+            <a:r>
+              <a:rPr lang="en-US" dirty="0" err="1"/>
+              <a:t>xls</a:t>
+            </a:r>
+            <a:r>
+              <a:rPr lang="en-US" dirty="0"/>
+              <a:t>*)</a:t>
+            </a:r>
+          </a:p>
+          <a:p>
+            <a:r>
+              <a:rPr lang="en-US" dirty="0"/>
+              <a:t>JSON (.</a:t>
+            </a:r>
+            <a:r>
+              <a:rPr lang="en-US" dirty="0" err="1"/>
+              <a:t>json</a:t>
+            </a:r>
+            <a:r>
+              <a:rPr lang="en-US" dirty="0"/>
+              <a:t>)</a:t>
             </a:r>
           </a:p>
           <a:p>
             <a:pPr lvl="1"/>
             <a:r>
               <a:rPr lang="en-US" dirty="0"/>
-              <a:t>Does this make sense?</a:t>
-            </a:r>
-          </a:p>
-          <a:p>
-            <a:r>
-              <a:rPr lang="en-US" dirty="0"/>
-              <a:t>If this a problem (which it often is), change the type of the column with </a:t>
-            </a:r>
-            <a:r>
-              <a:rPr lang="en-US" dirty="0" err="1">
-                <a:latin typeface="Courier New" panose="02070309020205020404" pitchFamily="49" charset="0"/>
-                <a:cs typeface="Courier New" panose="02070309020205020404" pitchFamily="49" charset="0"/>
-              </a:rPr>
-              <a:t>as.character</a:t>
-            </a:r>
-            <a:r>
-              <a:rPr lang="en-US" dirty="0">
-                <a:latin typeface="Courier New" panose="02070309020205020404" pitchFamily="49" charset="0"/>
-                <a:cs typeface="Courier New" panose="02070309020205020404" pitchFamily="49" charset="0"/>
-              </a:rPr>
-              <a:t>().</a:t>
+              <a:t>Example</a:t>
+            </a:r>
+          </a:p>
+          <a:p>
+            <a:r>
+              <a:rPr lang="en-US" dirty="0"/>
+              <a:t>XML (.xml)</a:t>
             </a:r>
           </a:p>
           <a:p>
             <a:pPr lvl="1"/>
             <a:r>
-              <a:rPr lang="en-US" dirty="0" err="1">
-                <a:latin typeface="Courier New" panose="02070309020205020404" pitchFamily="49" charset="0"/>
-                <a:cs typeface="Courier New" panose="02070309020205020404" pitchFamily="49" charset="0"/>
-              </a:rPr>
-              <a:t>df$name</a:t>
-            </a:r>
-            <a:r>
-              <a:rPr lang="en-US" dirty="0">
-                <a:latin typeface="Courier New" panose="02070309020205020404" pitchFamily="49" charset="0"/>
-                <a:cs typeface="Courier New" panose="02070309020205020404" pitchFamily="49" charset="0"/>
-              </a:rPr>
-              <a:t> &lt;- </a:t>
-            </a:r>
-            <a:r>
-              <a:rPr lang="en-US" dirty="0" err="1">
-                <a:latin typeface="Courier New" panose="02070309020205020404" pitchFamily="49" charset="0"/>
-                <a:cs typeface="Courier New" panose="02070309020205020404" pitchFamily="49" charset="0"/>
-              </a:rPr>
-              <a:t>as.character</a:t>
-            </a:r>
-            <a:r>
-              <a:rPr lang="en-US" dirty="0">
-                <a:latin typeface="Courier New" panose="02070309020205020404" pitchFamily="49" charset="0"/>
-                <a:cs typeface="Courier New" panose="02070309020205020404" pitchFamily="49" charset="0"/>
-              </a:rPr>
-              <a:t>(</a:t>
-            </a:r>
-            <a:r>
-              <a:rPr lang="en-US" dirty="0" err="1">
-                <a:latin typeface="Courier New" panose="02070309020205020404" pitchFamily="49" charset="0"/>
-                <a:cs typeface="Courier New" panose="02070309020205020404" pitchFamily="49" charset="0"/>
-              </a:rPr>
-              <a:t>df$name</a:t>
-            </a:r>
-            <a:r>
-              <a:rPr lang="en-US" dirty="0">
-                <a:latin typeface="Courier New" panose="02070309020205020404" pitchFamily="49" charset="0"/>
-                <a:cs typeface="Courier New" panose="02070309020205020404" pitchFamily="49" charset="0"/>
-              </a:rPr>
-              <a:t>)</a:t>
-            </a:r>
-            <a:endParaRPr lang="en-US" dirty="0"/>
+              <a:rPr lang="en-US" dirty="0"/>
+              <a:t>Example</a:t>
+            </a:r>
           </a:p>
         </p:txBody>
       </p:sp>
@@ -8256,7 +8209,7 @@
     </p:spTree>
     <p:extLst>
       <p:ext uri="{BB962C8B-B14F-4D97-AF65-F5344CB8AC3E}">
-        <p14:creationId xmlns:p14="http://schemas.microsoft.com/office/powerpoint/2010/main" val="2216792158"/>
+        <p14:creationId xmlns:p14="http://schemas.microsoft.com/office/powerpoint/2010/main" val="880888547"/>
       </p:ext>
     </p:extLst>
   </p:cSld>
@@ -8285,13 +8238,7 @@
       </p:grpSpPr>
       <p:sp>
         <p:nvSpPr>
-          <p:cNvPr id="7" name="Title 6">
-            <a:extLst>
-              <a:ext uri="{FF2B5EF4-FFF2-40B4-BE49-F238E27FC236}">
-                <a16:creationId xmlns:a16="http://schemas.microsoft.com/office/drawing/2014/main" id="{184E2338-1026-45D4-9455-B21A88F18B28}"/>
-              </a:ext>
-            </a:extLst>
-          </p:cNvPr>
+          <p:cNvPr id="7" name="Title 6"/>
           <p:cNvSpPr>
             <a:spLocks noGrp="1"/>
           </p:cNvSpPr>
@@ -8306,48 +8253,143 @@
           <a:p>
             <a:r>
               <a:rPr lang="en-US" dirty="0"/>
-              <a:t>DATA MANIPULATION</a:t>
-            </a:r>
-          </a:p>
-        </p:txBody>
-      </p:sp>
-      <p:sp>
-        <p:nvSpPr>
-          <p:cNvPr id="8" name="Text Placeholder 7">
-            <a:extLst>
-              <a:ext uri="{FF2B5EF4-FFF2-40B4-BE49-F238E27FC236}">
-                <a16:creationId xmlns:a16="http://schemas.microsoft.com/office/drawing/2014/main" id="{DB42CCAB-C8E2-48A8-A9DF-EB0383A8B33C}"/>
-              </a:ext>
-            </a:extLst>
-          </p:cNvPr>
-          <p:cNvSpPr>
-            <a:spLocks noGrp="1"/>
-          </p:cNvSpPr>
-          <p:nvPr>
-            <p:ph type="body" idx="1"/>
-          </p:nvPr>
-        </p:nvSpPr>
-        <p:spPr/>
-        <p:txBody>
-          <a:bodyPr/>
-          <a:lstStyle/>
-          <a:p>
-            <a:r>
-              <a:rPr lang="en-US" dirty="0"/>
-              <a:t>Subsetting and filtering</a:t>
-            </a:r>
-          </a:p>
-        </p:txBody>
-      </p:sp>
-      <p:sp>
-        <p:nvSpPr>
-          <p:cNvPr id="4" name="Date Placeholder 3">
-            <a:extLst>
-              <a:ext uri="{FF2B5EF4-FFF2-40B4-BE49-F238E27FC236}">
-                <a16:creationId xmlns:a16="http://schemas.microsoft.com/office/drawing/2014/main" id="{1CA94ACB-62A5-4F09-8C21-F0CE9BFB1606}"/>
-              </a:ext>
-            </a:extLst>
-          </p:cNvPr>
+              <a:t>A WORD OF WARNING ON FACTORS</a:t>
+            </a:r>
+          </a:p>
+        </p:txBody>
+      </p:sp>
+      <p:sp>
+        <p:nvSpPr>
+          <p:cNvPr id="8" name="Content Placeholder 7"/>
+          <p:cNvSpPr>
+            <a:spLocks noGrp="1"/>
+          </p:cNvSpPr>
+          <p:nvPr>
+            <p:ph idx="1"/>
+          </p:nvPr>
+        </p:nvSpPr>
+        <p:spPr/>
+        <p:txBody>
+          <a:bodyPr/>
+          <a:lstStyle/>
+          <a:p>
+            <a:r>
+              <a:rPr lang="en-US" dirty="0"/>
+              <a:t>R is quick to assume strings you pass in data frames are factors</a:t>
+            </a:r>
+          </a:p>
+          <a:p>
+            <a:r>
+              <a:rPr lang="en-US" dirty="0"/>
+              <a:t>Example: </a:t>
+            </a:r>
+            <a:r>
+              <a:rPr lang="en-US" dirty="0">
+                <a:latin typeface="Courier New" panose="02070309020205020404" pitchFamily="49" charset="0"/>
+                <a:cs typeface="Courier New" panose="02070309020205020404" pitchFamily="49" charset="0"/>
+              </a:rPr>
+              <a:t>df &lt;- </a:t>
+            </a:r>
+            <a:r>
+              <a:rPr lang="en-US" dirty="0" err="1">
+                <a:latin typeface="Courier New" panose="02070309020205020404" pitchFamily="49" charset="0"/>
+                <a:cs typeface="Courier New" panose="02070309020205020404" pitchFamily="49" charset="0"/>
+              </a:rPr>
+              <a:t>data.frame</a:t>
+            </a:r>
+            <a:r>
+              <a:rPr lang="en-US" dirty="0">
+                <a:latin typeface="Courier New" panose="02070309020205020404" pitchFamily="49" charset="0"/>
+                <a:cs typeface="Courier New" panose="02070309020205020404" pitchFamily="49" charset="0"/>
+              </a:rPr>
+              <a:t>(name=c(“John”, “Molly”), age=c(15,17))</a:t>
+            </a:r>
+          </a:p>
+          <a:p>
+            <a:pPr lvl="1"/>
+            <a:r>
+              <a:rPr lang="en-US" dirty="0"/>
+              <a:t>Name is a factor!</a:t>
+            </a:r>
+          </a:p>
+          <a:p>
+            <a:pPr lvl="1"/>
+            <a:r>
+              <a:rPr lang="en-US" dirty="0"/>
+              <a:t>Does this make sense?</a:t>
+            </a:r>
+          </a:p>
+          <a:p>
+            <a:r>
+              <a:rPr lang="en-US" dirty="0"/>
+              <a:t>If this a problem (which it often is), change the type of the column with </a:t>
+            </a:r>
+            <a:r>
+              <a:rPr lang="en-US" dirty="0" err="1">
+                <a:latin typeface="Courier New" panose="02070309020205020404" pitchFamily="49" charset="0"/>
+                <a:cs typeface="Courier New" panose="02070309020205020404" pitchFamily="49" charset="0"/>
+              </a:rPr>
+              <a:t>as.character</a:t>
+            </a:r>
+            <a:r>
+              <a:rPr lang="en-US" dirty="0">
+                <a:latin typeface="Courier New" panose="02070309020205020404" pitchFamily="49" charset="0"/>
+                <a:cs typeface="Courier New" panose="02070309020205020404" pitchFamily="49" charset="0"/>
+              </a:rPr>
+              <a:t>().</a:t>
+            </a:r>
+          </a:p>
+          <a:p>
+            <a:pPr lvl="1"/>
+            <a:r>
+              <a:rPr lang="en-US" dirty="0" err="1">
+                <a:latin typeface="Courier New" panose="02070309020205020404" pitchFamily="49" charset="0"/>
+                <a:cs typeface="Courier New" panose="02070309020205020404" pitchFamily="49" charset="0"/>
+              </a:rPr>
+              <a:t>df$name</a:t>
+            </a:r>
+            <a:r>
+              <a:rPr lang="en-US" dirty="0">
+                <a:latin typeface="Courier New" panose="02070309020205020404" pitchFamily="49" charset="0"/>
+                <a:cs typeface="Courier New" panose="02070309020205020404" pitchFamily="49" charset="0"/>
+              </a:rPr>
+              <a:t> &lt;- </a:t>
+            </a:r>
+            <a:r>
+              <a:rPr lang="en-US" dirty="0" err="1">
+                <a:latin typeface="Courier New" panose="02070309020205020404" pitchFamily="49" charset="0"/>
+                <a:cs typeface="Courier New" panose="02070309020205020404" pitchFamily="49" charset="0"/>
+              </a:rPr>
+              <a:t>as.character</a:t>
+            </a:r>
+            <a:r>
+              <a:rPr lang="en-US" dirty="0">
+                <a:latin typeface="Courier New" panose="02070309020205020404" pitchFamily="49" charset="0"/>
+                <a:cs typeface="Courier New" panose="02070309020205020404" pitchFamily="49" charset="0"/>
+              </a:rPr>
+              <a:t>(</a:t>
+            </a:r>
+            <a:r>
+              <a:rPr lang="en-US" dirty="0" err="1">
+                <a:latin typeface="Courier New" panose="02070309020205020404" pitchFamily="49" charset="0"/>
+                <a:cs typeface="Courier New" panose="02070309020205020404" pitchFamily="49" charset="0"/>
+              </a:rPr>
+              <a:t>df$name</a:t>
+            </a:r>
+            <a:r>
+              <a:rPr lang="en-US" dirty="0">
+                <a:latin typeface="Courier New" panose="02070309020205020404" pitchFamily="49" charset="0"/>
+                <a:cs typeface="Courier New" panose="02070309020205020404" pitchFamily="49" charset="0"/>
+              </a:rPr>
+              <a:t>)</a:t>
+            </a:r>
+            <a:endParaRPr lang="en-US" dirty="0"/>
+          </a:p>
+        </p:txBody>
+      </p:sp>
+      <p:sp>
+        <p:nvSpPr>
+          <p:cNvPr id="4" name="Date Placeholder 3"/>
           <p:cNvSpPr>
             <a:spLocks noGrp="1"/>
           </p:cNvSpPr>
@@ -8360,7 +8402,7 @@
           <a:bodyPr/>
           <a:lstStyle/>
           <a:p>
-            <a:fld id="{8AAE40A0-A7D8-4DC3-BC9E-BADA32DA2004}" type="datetime4">
+            <a:fld id="{B08FEED8-D7D4-44E9-BFBC-ED06B5996D94}" type="datetime4">
               <a:rPr lang="en-US" smtClean="0"/>
               <a:t>June 29, 2019</a:t>
             </a:fld>
@@ -8370,13 +8412,7 @@
       </p:sp>
       <p:sp>
         <p:nvSpPr>
-          <p:cNvPr id="5" name="Footer Placeholder 4">
-            <a:extLst>
-              <a:ext uri="{FF2B5EF4-FFF2-40B4-BE49-F238E27FC236}">
-                <a16:creationId xmlns:a16="http://schemas.microsoft.com/office/drawing/2014/main" id="{D20B02B0-893D-4696-B6F7-A126B8D18E99}"/>
-              </a:ext>
-            </a:extLst>
-          </p:cNvPr>
+          <p:cNvPr id="5" name="Footer Placeholder 4"/>
           <p:cNvSpPr>
             <a:spLocks noGrp="1"/>
           </p:cNvSpPr>
@@ -8427,13 +8463,7 @@
       </p:sp>
       <p:sp>
         <p:nvSpPr>
-          <p:cNvPr id="6" name="Slide Number Placeholder 5">
-            <a:extLst>
-              <a:ext uri="{FF2B5EF4-FFF2-40B4-BE49-F238E27FC236}">
-                <a16:creationId xmlns:a16="http://schemas.microsoft.com/office/drawing/2014/main" id="{1CFDA495-0063-4571-8969-0DD770DB39E0}"/>
-              </a:ext>
-            </a:extLst>
-          </p:cNvPr>
+          <p:cNvPr id="6" name="Slide Number Placeholder 5"/>
           <p:cNvSpPr>
             <a:spLocks noGrp="1"/>
           </p:cNvSpPr>
@@ -8457,7 +8487,7 @@
     </p:spTree>
     <p:extLst>
       <p:ext uri="{BB962C8B-B14F-4D97-AF65-F5344CB8AC3E}">
-        <p14:creationId xmlns:p14="http://schemas.microsoft.com/office/powerpoint/2010/main" val="495434477"/>
+        <p14:creationId xmlns:p14="http://schemas.microsoft.com/office/powerpoint/2010/main" val="2216792158"/>
       </p:ext>
     </p:extLst>
   </p:cSld>
@@ -8486,7 +8516,13 @@
       </p:grpSpPr>
       <p:sp>
         <p:nvSpPr>
-          <p:cNvPr id="7" name="Title 6"/>
+          <p:cNvPr id="7" name="Title 6">
+            <a:extLst>
+              <a:ext uri="{FF2B5EF4-FFF2-40B4-BE49-F238E27FC236}">
+                <a16:creationId xmlns:a16="http://schemas.microsoft.com/office/drawing/2014/main" id="{184E2338-1026-45D4-9455-B21A88F18B28}"/>
+              </a:ext>
+            </a:extLst>
+          </p:cNvPr>
           <p:cNvSpPr>
             <a:spLocks noGrp="1"/>
           </p:cNvSpPr>
@@ -8501,42 +8537,48 @@
           <a:p>
             <a:r>
               <a:rPr lang="en-US" dirty="0"/>
-              <a:t>SUBSETTING</a:t>
-            </a:r>
-          </a:p>
-        </p:txBody>
-      </p:sp>
-      <p:sp>
-        <p:nvSpPr>
-          <p:cNvPr id="8" name="Content Placeholder 7"/>
-          <p:cNvSpPr>
-            <a:spLocks noGrp="1"/>
-          </p:cNvSpPr>
-          <p:nvPr>
-            <p:ph idx="1"/>
-          </p:nvPr>
-        </p:nvSpPr>
-        <p:spPr/>
-        <p:txBody>
-          <a:bodyPr/>
-          <a:lstStyle/>
-          <a:p>
-            <a:r>
-              <a:rPr lang="en-US" dirty="0"/>
-              <a:t>By Row:</a:t>
-            </a:r>
-          </a:p>
-          <a:p>
-            <a:r>
-              <a:rPr lang="en-US" dirty="0"/>
-              <a:t>By Column:</a:t>
-            </a:r>
-          </a:p>
-        </p:txBody>
-      </p:sp>
-      <p:sp>
-        <p:nvSpPr>
-          <p:cNvPr id="4" name="Date Placeholder 3"/>
+              <a:t>DATA MANIPULATION</a:t>
+            </a:r>
+          </a:p>
+        </p:txBody>
+      </p:sp>
+      <p:sp>
+        <p:nvSpPr>
+          <p:cNvPr id="8" name="Text Placeholder 7">
+            <a:extLst>
+              <a:ext uri="{FF2B5EF4-FFF2-40B4-BE49-F238E27FC236}">
+                <a16:creationId xmlns:a16="http://schemas.microsoft.com/office/drawing/2014/main" id="{DB42CCAB-C8E2-48A8-A9DF-EB0383A8B33C}"/>
+              </a:ext>
+            </a:extLst>
+          </p:cNvPr>
+          <p:cNvSpPr>
+            <a:spLocks noGrp="1"/>
+          </p:cNvSpPr>
+          <p:nvPr>
+            <p:ph type="body" idx="1"/>
+          </p:nvPr>
+        </p:nvSpPr>
+        <p:spPr/>
+        <p:txBody>
+          <a:bodyPr/>
+          <a:lstStyle/>
+          <a:p>
+            <a:r>
+              <a:rPr lang="en-US" dirty="0"/>
+              <a:t>Subsetting and filtering</a:t>
+            </a:r>
+          </a:p>
+        </p:txBody>
+      </p:sp>
+      <p:sp>
+        <p:nvSpPr>
+          <p:cNvPr id="4" name="Date Placeholder 3">
+            <a:extLst>
+              <a:ext uri="{FF2B5EF4-FFF2-40B4-BE49-F238E27FC236}">
+                <a16:creationId xmlns:a16="http://schemas.microsoft.com/office/drawing/2014/main" id="{1CA94ACB-62A5-4F09-8C21-F0CE9BFB1606}"/>
+              </a:ext>
+            </a:extLst>
+          </p:cNvPr>
           <p:cNvSpPr>
             <a:spLocks noGrp="1"/>
           </p:cNvSpPr>
@@ -8549,7 +8591,7 @@
           <a:bodyPr/>
           <a:lstStyle/>
           <a:p>
-            <a:fld id="{B08FEED8-D7D4-44E9-BFBC-ED06B5996D94}" type="datetime4">
+            <a:fld id="{8AAE40A0-A7D8-4DC3-BC9E-BADA32DA2004}" type="datetime4">
               <a:rPr lang="en-US" smtClean="0"/>
               <a:t>June 29, 2019</a:t>
             </a:fld>
@@ -8559,7 +8601,13 @@
       </p:sp>
       <p:sp>
         <p:nvSpPr>
-          <p:cNvPr id="5" name="Footer Placeholder 4"/>
+          <p:cNvPr id="5" name="Footer Placeholder 4">
+            <a:extLst>
+              <a:ext uri="{FF2B5EF4-FFF2-40B4-BE49-F238E27FC236}">
+                <a16:creationId xmlns:a16="http://schemas.microsoft.com/office/drawing/2014/main" id="{D20B02B0-893D-4696-B6F7-A126B8D18E99}"/>
+              </a:ext>
+            </a:extLst>
+          </p:cNvPr>
           <p:cNvSpPr>
             <a:spLocks noGrp="1"/>
           </p:cNvSpPr>
@@ -8610,7 +8658,13 @@
       </p:sp>
       <p:sp>
         <p:nvSpPr>
-          <p:cNvPr id="6" name="Slide Number Placeholder 5"/>
+          <p:cNvPr id="6" name="Slide Number Placeholder 5">
+            <a:extLst>
+              <a:ext uri="{FF2B5EF4-FFF2-40B4-BE49-F238E27FC236}">
+                <a16:creationId xmlns:a16="http://schemas.microsoft.com/office/drawing/2014/main" id="{1CFDA495-0063-4571-8969-0DD770DB39E0}"/>
+              </a:ext>
+            </a:extLst>
+          </p:cNvPr>
           <p:cNvSpPr>
             <a:spLocks noGrp="1"/>
           </p:cNvSpPr>
@@ -8634,7 +8688,7 @@
     </p:spTree>
     <p:extLst>
       <p:ext uri="{BB962C8B-B14F-4D97-AF65-F5344CB8AC3E}">
-        <p14:creationId xmlns:p14="http://schemas.microsoft.com/office/powerpoint/2010/main" val="3381129877"/>
+        <p14:creationId xmlns:p14="http://schemas.microsoft.com/office/powerpoint/2010/main" val="495434477"/>
       </p:ext>
     </p:extLst>
   </p:cSld>
@@ -8678,7 +8732,7 @@
           <a:p>
             <a:r>
               <a:rPr lang="en-US" dirty="0"/>
-              <a:t>FILTERING</a:t>
+              <a:t>LOGICAL OPERATORS</a:t>
             </a:r>
           </a:p>
         </p:txBody>
@@ -8697,6 +8751,84 @@
         <p:txBody>
           <a:bodyPr/>
           <a:lstStyle/>
+          <a:p>
+            <a:r>
+              <a:rPr lang="en-US" dirty="0"/>
+              <a:t>Test for Equality: </a:t>
+            </a:r>
+            <a:r>
+              <a:rPr lang="en-US" dirty="0">
+                <a:latin typeface="Courier New" panose="02070309020205020404" pitchFamily="49" charset="0"/>
+                <a:cs typeface="Courier New" panose="02070309020205020404" pitchFamily="49" charset="0"/>
+              </a:rPr>
+              <a:t>== (a == b)</a:t>
+            </a:r>
+          </a:p>
+          <a:p>
+            <a:r>
+              <a:rPr lang="en-US" dirty="0"/>
+              <a:t>Test for Inequality: </a:t>
+            </a:r>
+            <a:r>
+              <a:rPr lang="en-US" dirty="0">
+                <a:latin typeface="Courier New" panose="02070309020205020404" pitchFamily="49" charset="0"/>
+                <a:cs typeface="Courier New" panose="02070309020205020404" pitchFamily="49" charset="0"/>
+              </a:rPr>
+              <a:t>!= (a != b)</a:t>
+            </a:r>
+          </a:p>
+          <a:p>
+            <a:r>
+              <a:rPr lang="en-US" dirty="0"/>
+              <a:t>Test for Less than: </a:t>
+            </a:r>
+            <a:r>
+              <a:rPr lang="en-US" dirty="0">
+                <a:latin typeface="Courier New" panose="02070309020205020404" pitchFamily="49" charset="0"/>
+                <a:cs typeface="Courier New" panose="02070309020205020404" pitchFamily="49" charset="0"/>
+              </a:rPr>
+              <a:t>&lt; (a &lt; b)</a:t>
+            </a:r>
+          </a:p>
+          <a:p>
+            <a:r>
+              <a:rPr lang="en-US" dirty="0"/>
+              <a:t>Test for Less than or equal to: </a:t>
+            </a:r>
+            <a:r>
+              <a:rPr lang="en-US" dirty="0">
+                <a:latin typeface="Courier New" panose="02070309020205020404" pitchFamily="49" charset="0"/>
+                <a:cs typeface="Courier New" panose="02070309020205020404" pitchFamily="49" charset="0"/>
+              </a:rPr>
+              <a:t>&lt;= (a &lt;= b)</a:t>
+            </a:r>
+          </a:p>
+          <a:p>
+            <a:r>
+              <a:rPr lang="en-US" dirty="0"/>
+              <a:t>Test for Greater than: </a:t>
+            </a:r>
+            <a:r>
+              <a:rPr lang="en-US" dirty="0">
+                <a:latin typeface="Courier New" panose="02070309020205020404" pitchFamily="49" charset="0"/>
+                <a:cs typeface="Courier New" panose="02070309020205020404" pitchFamily="49" charset="0"/>
+              </a:rPr>
+              <a:t>&gt; (a &gt; b)</a:t>
+            </a:r>
+          </a:p>
+          <a:p>
+            <a:r>
+              <a:rPr lang="en-US" dirty="0"/>
+              <a:t>Test for Greater than or equal to: </a:t>
+            </a:r>
+            <a:r>
+              <a:rPr lang="en-US" dirty="0">
+                <a:latin typeface="Courier New" panose="02070309020205020404" pitchFamily="49" charset="0"/>
+                <a:cs typeface="Courier New" panose="02070309020205020404" pitchFamily="49" charset="0"/>
+              </a:rPr>
+              <a:t>&gt;= (a &gt; b)</a:t>
+            </a:r>
+          </a:p>
           <a:p>
             <a:endParaRPr lang="en-US" dirty="0"/>
           </a:p>
@@ -8719,7 +8851,7 @@
           <a:p>
             <a:fld id="{B08FEED8-D7D4-44E9-BFBC-ED06B5996D94}" type="datetime4">
               <a:rPr lang="en-US" smtClean="0"/>
-              <a:t>June 29, 2019</a:t>
+              <a:t>June 30, 2019</a:t>
             </a:fld>
             <a:endParaRPr lang="en-US" dirty="0"/>
           </a:p>
@@ -8802,7 +8934,7 @@
     </p:spTree>
     <p:extLst>
       <p:ext uri="{BB962C8B-B14F-4D97-AF65-F5344CB8AC3E}">
-        <p14:creationId xmlns:p14="http://schemas.microsoft.com/office/powerpoint/2010/main" val="2527648360"/>
+        <p14:creationId xmlns:p14="http://schemas.microsoft.com/office/powerpoint/2010/main" val="3700448618"/>
       </p:ext>
     </p:extLst>
   </p:cSld>
@@ -9015,7 +9147,7 @@
           <a:p>
             <a:r>
               <a:rPr lang="en-US" dirty="0"/>
-              <a:t>CLEANING</a:t>
+              <a:t>FILTERING / SUBSETTING</a:t>
             </a:r>
           </a:p>
         </p:txBody>
@@ -9037,7 +9169,59 @@
           <a:p>
             <a:r>
               <a:rPr lang="en-US" dirty="0"/>
-              <a:t>Use filter to delete unusable rows</a:t>
+              <a:t>By Row:</a:t>
+            </a:r>
+          </a:p>
+          <a:p>
+            <a:pPr lvl="1"/>
+            <a:r>
+              <a:rPr lang="en-US" dirty="0">
+                <a:latin typeface="Courier New" panose="02070309020205020404" pitchFamily="49" charset="0"/>
+                <a:cs typeface="Courier New" panose="02070309020205020404" pitchFamily="49" charset="0"/>
+              </a:rPr>
+              <a:t>df[3-7]</a:t>
+            </a:r>
+            <a:r>
+              <a:rPr lang="en-US" dirty="0"/>
+              <a:t> selects the 3</a:t>
+            </a:r>
+            <a:r>
+              <a:rPr lang="en-US" baseline="30000" dirty="0"/>
+              <a:t>rd</a:t>
+            </a:r>
+            <a:r>
+              <a:rPr lang="en-US" dirty="0"/>
+              <a:t> through 7</a:t>
+            </a:r>
+            <a:r>
+              <a:rPr lang="en-US" baseline="30000" dirty="0"/>
+              <a:t>th</a:t>
+            </a:r>
+            <a:r>
+              <a:rPr lang="en-US" dirty="0"/>
+              <a:t> row</a:t>
+            </a:r>
+          </a:p>
+          <a:p>
+            <a:r>
+              <a:rPr lang="en-US" dirty="0"/>
+              <a:t>By Column:</a:t>
+            </a:r>
+          </a:p>
+          <a:p>
+            <a:pPr lvl="1"/>
+            <a:r>
+              <a:rPr lang="en-US" dirty="0">
+                <a:latin typeface="Courier New" panose="02070309020205020404" pitchFamily="49" charset="0"/>
+                <a:cs typeface="Courier New" panose="02070309020205020404" pitchFamily="49" charset="0"/>
+              </a:rPr>
+              <a:t>subset(df, age&gt;10) </a:t>
+            </a:r>
+            <a:r>
+              <a:rPr lang="en-US" dirty="0">
+                <a:cs typeface="Courier New" panose="02070309020205020404" pitchFamily="49" charset="0"/>
+              </a:rPr>
+              <a:t>takes all observations where age is greater than 10. note that age is a column in the data frame!</a:t>
             </a:r>
           </a:p>
         </p:txBody>
@@ -9142,7 +9326,7 @@
     </p:spTree>
     <p:extLst>
       <p:ext uri="{BB962C8B-B14F-4D97-AF65-F5344CB8AC3E}">
-        <p14:creationId xmlns:p14="http://schemas.microsoft.com/office/powerpoint/2010/main" val="1734905602"/>
+        <p14:creationId xmlns:p14="http://schemas.microsoft.com/office/powerpoint/2010/main" val="3381129877"/>
       </p:ext>
     </p:extLst>
   </p:cSld>
@@ -9186,7 +9370,7 @@
           <a:p>
             <a:r>
               <a:rPr lang="en-US" dirty="0"/>
-              <a:t>SUMMARY FUNCTIONS</a:t>
+              <a:t>CLEANING</a:t>
             </a:r>
           </a:p>
         </p:txBody>
@@ -9208,7 +9392,22 @@
           <a:p>
             <a:r>
               <a:rPr lang="en-US" dirty="0"/>
-              <a:t>Mean, median, range, mode, standard deviation</a:t>
+              <a:t>Use </a:t>
+            </a:r>
+            <a:r>
+              <a:rPr lang="en-US" dirty="0" err="1"/>
+              <a:t>subsetting</a:t>
+            </a:r>
+            <a:r>
+              <a:rPr lang="en-US" dirty="0"/>
+              <a:t> to delete unusable rows</a:t>
+            </a:r>
+          </a:p>
+          <a:p>
+            <a:pPr lvl="1"/>
+            <a:r>
+              <a:rPr lang="en-US" dirty="0"/>
+              <a:t>Common: remove rows which have a NA</a:t>
             </a:r>
           </a:p>
         </p:txBody>
@@ -9313,7 +9512,7 @@
     </p:spTree>
     <p:extLst>
       <p:ext uri="{BB962C8B-B14F-4D97-AF65-F5344CB8AC3E}">
-        <p14:creationId xmlns:p14="http://schemas.microsoft.com/office/powerpoint/2010/main" val="1071271775"/>
+        <p14:creationId xmlns:p14="http://schemas.microsoft.com/office/powerpoint/2010/main" val="1734905602"/>
       </p:ext>
     </p:extLst>
   </p:cSld>
@@ -9357,7 +9556,7 @@
           <a:p>
             <a:r>
               <a:rPr lang="en-US" dirty="0"/>
-              <a:t>THE APPLY FAMILY</a:t>
+              <a:t>SUMMARY FUNCTIONS</a:t>
             </a:r>
           </a:p>
         </p:txBody>
@@ -9377,7 +9576,87 @@
           <a:bodyPr/>
           <a:lstStyle/>
           <a:p>
-            <a:endParaRPr lang="en-US" dirty="0"/>
+            <a:r>
+              <a:rPr lang="en-US" dirty="0"/>
+              <a:t>Mean: </a:t>
+            </a:r>
+            <a:r>
+              <a:rPr lang="en-US" dirty="0">
+                <a:latin typeface="Courier New" panose="02070309020205020404" pitchFamily="49" charset="0"/>
+                <a:cs typeface="Courier New" panose="02070309020205020404" pitchFamily="49" charset="0"/>
+              </a:rPr>
+              <a:t>mean(data)</a:t>
+            </a:r>
+          </a:p>
+          <a:p>
+            <a:r>
+              <a:rPr lang="en-US" dirty="0"/>
+              <a:t>Median: </a:t>
+            </a:r>
+            <a:r>
+              <a:rPr lang="en-US" dirty="0">
+                <a:latin typeface="Courier New" panose="02070309020205020404" pitchFamily="49" charset="0"/>
+                <a:cs typeface="Courier New" panose="02070309020205020404" pitchFamily="49" charset="0"/>
+              </a:rPr>
+              <a:t>median(data)</a:t>
+            </a:r>
+          </a:p>
+          <a:p>
+            <a:r>
+              <a:rPr lang="en-US" dirty="0"/>
+              <a:t>Range: </a:t>
+            </a:r>
+            <a:r>
+              <a:rPr lang="en-US" dirty="0">
+                <a:latin typeface="Courier New" panose="02070309020205020404" pitchFamily="49" charset="0"/>
+                <a:cs typeface="Courier New" panose="02070309020205020404" pitchFamily="49" charset="0"/>
+              </a:rPr>
+              <a:t>range(data). </a:t>
+            </a:r>
+            <a:r>
+              <a:rPr lang="en-US" dirty="0"/>
+              <a:t>Gives lower and upper bounds</a:t>
+            </a:r>
+          </a:p>
+          <a:p>
+            <a:r>
+              <a:rPr lang="en-US" dirty="0"/>
+              <a:t>Standard Deviation: </a:t>
+            </a:r>
+            <a:r>
+              <a:rPr lang="en-US" dirty="0" err="1">
+                <a:latin typeface="Courier New" panose="02070309020205020404" pitchFamily="49" charset="0"/>
+                <a:cs typeface="Courier New" panose="02070309020205020404" pitchFamily="49" charset="0"/>
+              </a:rPr>
+              <a:t>sd</a:t>
+            </a:r>
+            <a:r>
+              <a:rPr lang="en-US" dirty="0">
+                <a:latin typeface="Courier New" panose="02070309020205020404" pitchFamily="49" charset="0"/>
+                <a:cs typeface="Courier New" panose="02070309020205020404" pitchFamily="49" charset="0"/>
+              </a:rPr>
+              <a:t>(data)</a:t>
+            </a:r>
+          </a:p>
+          <a:p>
+            <a:endParaRPr lang="en-US" dirty="0"/>
+          </a:p>
+          <a:p>
+            <a:r>
+              <a:rPr lang="en-US" dirty="0"/>
+              <a:t>The </a:t>
+            </a:r>
+            <a:r>
+              <a:rPr lang="en-US" dirty="0">
+                <a:latin typeface="Courier New" panose="02070309020205020404" pitchFamily="49" charset="0"/>
+                <a:cs typeface="Courier New" panose="02070309020205020404" pitchFamily="49" charset="0"/>
+              </a:rPr>
+              <a:t>NA.RM </a:t>
+            </a:r>
+            <a:r>
+              <a:rPr lang="en-US" dirty="0"/>
+              <a:t>feature: ignore any missing values. Summaries don’t work otherwise!</a:t>
+            </a:r>
           </a:p>
         </p:txBody>
       </p:sp>
@@ -9481,7 +9760,7 @@
     </p:spTree>
     <p:extLst>
       <p:ext uri="{BB962C8B-B14F-4D97-AF65-F5344CB8AC3E}">
-        <p14:creationId xmlns:p14="http://schemas.microsoft.com/office/powerpoint/2010/main" val="2319623369"/>
+        <p14:creationId xmlns:p14="http://schemas.microsoft.com/office/powerpoint/2010/main" val="1071271775"/>
       </p:ext>
     </p:extLst>
   </p:cSld>
@@ -9525,7 +9804,7 @@
           <a:p>
             <a:r>
               <a:rPr lang="en-US" dirty="0"/>
-              <a:t>LOGICAL INDEXING</a:t>
+              <a:t>THE APPLY FAMILY</a:t>
             </a:r>
           </a:p>
         </p:txBody>
@@ -9542,10 +9821,170 @@
         </p:nvSpPr>
         <p:spPr/>
         <p:txBody>
-          <a:bodyPr/>
-          <a:lstStyle/>
-          <a:p>
-            <a:endParaRPr lang="en-US" dirty="0"/>
+          <a:bodyPr>
+            <a:normAutofit/>
+          </a:bodyPr>
+          <a:lstStyle/>
+          <a:p>
+            <a:r>
+              <a:rPr lang="en-US" sz="2400" dirty="0" err="1">
+                <a:latin typeface="Courier New" panose="02070309020205020404" pitchFamily="49" charset="0"/>
+                <a:cs typeface="Courier New" panose="02070309020205020404" pitchFamily="49" charset="0"/>
+              </a:rPr>
+              <a:t>sapply</a:t>
+            </a:r>
+            <a:r>
+              <a:rPr lang="en-US" sz="2400" dirty="0">
+                <a:latin typeface="Courier New" panose="02070309020205020404" pitchFamily="49" charset="0"/>
+                <a:cs typeface="Courier New" panose="02070309020205020404" pitchFamily="49" charset="0"/>
+              </a:rPr>
+              <a:t>(col, function)</a:t>
+            </a:r>
+          </a:p>
+          <a:p>
+            <a:pPr lvl="1"/>
+            <a:r>
+              <a:rPr lang="en-US" dirty="0"/>
+              <a:t>Apply function to every element of a vector, and use simplest type of output (e.g. vector if all elements of list are the same)</a:t>
+            </a:r>
+          </a:p>
+          <a:p>
+            <a:pPr lvl="2"/>
+            <a:r>
+              <a:rPr lang="en-US" dirty="0"/>
+              <a:t>Ex: </a:t>
+            </a:r>
+            <a:r>
+              <a:rPr lang="en-US" sz="2400" dirty="0" err="1">
+                <a:latin typeface="Courier New" panose="02070309020205020404" pitchFamily="49" charset="0"/>
+                <a:cs typeface="Courier New" panose="02070309020205020404" pitchFamily="49" charset="0"/>
+              </a:rPr>
+              <a:t>sapply</a:t>
+            </a:r>
+            <a:r>
+              <a:rPr lang="en-US" sz="2400" dirty="0">
+                <a:latin typeface="Courier New" panose="02070309020205020404" pitchFamily="49" charset="0"/>
+                <a:cs typeface="Courier New" panose="02070309020205020404" pitchFamily="49" charset="0"/>
+              </a:rPr>
+              <a:t>(names, </a:t>
+            </a:r>
+            <a:r>
+              <a:rPr lang="en-US" sz="2400" dirty="0" err="1">
+                <a:latin typeface="Courier New" panose="02070309020205020404" pitchFamily="49" charset="0"/>
+                <a:cs typeface="Courier New" panose="02070309020205020404" pitchFamily="49" charset="0"/>
+              </a:rPr>
+              <a:t>tolower</a:t>
+            </a:r>
+            <a:r>
+              <a:rPr lang="en-US" sz="2400" dirty="0">
+                <a:latin typeface="Courier New" panose="02070309020205020404" pitchFamily="49" charset="0"/>
+                <a:cs typeface="Courier New" panose="02070309020205020404" pitchFamily="49" charset="0"/>
+              </a:rPr>
+              <a:t>)</a:t>
+            </a:r>
+          </a:p>
+          <a:p>
+            <a:r>
+              <a:rPr lang="en-US" sz="2400" dirty="0" err="1">
+                <a:latin typeface="Courier New" panose="02070309020205020404" pitchFamily="49" charset="0"/>
+                <a:cs typeface="Courier New" panose="02070309020205020404" pitchFamily="49" charset="0"/>
+              </a:rPr>
+              <a:t>tapply</a:t>
+            </a:r>
+            <a:r>
+              <a:rPr lang="en-US" sz="2400" dirty="0">
+                <a:latin typeface="Courier New" panose="02070309020205020404" pitchFamily="49" charset="0"/>
+                <a:cs typeface="Courier New" panose="02070309020205020404" pitchFamily="49" charset="0"/>
+              </a:rPr>
+              <a:t>(column, groups, function)</a:t>
+            </a:r>
+          </a:p>
+          <a:p>
+            <a:pPr lvl="1"/>
+            <a:r>
+              <a:rPr lang="en-US" dirty="0"/>
+              <a:t>Apply a summary function to a column for each of the groups</a:t>
+            </a:r>
+          </a:p>
+          <a:p>
+            <a:pPr lvl="1"/>
+            <a:r>
+              <a:rPr lang="en-US" dirty="0"/>
+              <a:t>Ex: Say </a:t>
+            </a:r>
+            <a:r>
+              <a:rPr lang="en-US" dirty="0" err="1">
+                <a:latin typeface="Courier New" panose="02070309020205020404" pitchFamily="49" charset="0"/>
+                <a:cs typeface="Courier New" panose="02070309020205020404" pitchFamily="49" charset="0"/>
+              </a:rPr>
+              <a:t>gpadf</a:t>
+            </a:r>
+            <a:r>
+              <a:rPr lang="en-US" dirty="0"/>
+              <a:t> is a </a:t>
+            </a:r>
+            <a:r>
+              <a:rPr lang="en-US" dirty="0" err="1"/>
+              <a:t>dataframe</a:t>
+            </a:r>
+            <a:r>
+              <a:rPr lang="en-US" dirty="0"/>
+              <a:t> of students. </a:t>
+            </a:r>
+            <a:r>
+              <a:rPr lang="en-US" dirty="0" err="1">
+                <a:latin typeface="Courier New" panose="02070309020205020404" pitchFamily="49" charset="0"/>
+                <a:cs typeface="Courier New" panose="02070309020205020404" pitchFamily="49" charset="0"/>
+              </a:rPr>
+              <a:t>tapply</a:t>
+            </a:r>
+            <a:r>
+              <a:rPr lang="en-US" dirty="0">
+                <a:latin typeface="Courier New" panose="02070309020205020404" pitchFamily="49" charset="0"/>
+                <a:cs typeface="Courier New" panose="02070309020205020404" pitchFamily="49" charset="0"/>
+              </a:rPr>
+              <a:t>(</a:t>
+            </a:r>
+            <a:r>
+              <a:rPr lang="en-US" dirty="0" err="1">
+                <a:latin typeface="Courier New" panose="02070309020205020404" pitchFamily="49" charset="0"/>
+                <a:cs typeface="Courier New" panose="02070309020205020404" pitchFamily="49" charset="0"/>
+              </a:rPr>
+              <a:t>gpadf$gpa</a:t>
+            </a:r>
+            <a:r>
+              <a:rPr lang="en-US" dirty="0">
+                <a:latin typeface="Courier New" panose="02070309020205020404" pitchFamily="49" charset="0"/>
+                <a:cs typeface="Courier New" panose="02070309020205020404" pitchFamily="49" charset="0"/>
+              </a:rPr>
+              <a:t>, </a:t>
+            </a:r>
+            <a:r>
+              <a:rPr lang="en-US" dirty="0" err="1">
+                <a:latin typeface="Courier New" panose="02070309020205020404" pitchFamily="49" charset="0"/>
+                <a:cs typeface="Courier New" panose="02070309020205020404" pitchFamily="49" charset="0"/>
+              </a:rPr>
+              <a:t>gpadf$major</a:t>
+            </a:r>
+            <a:r>
+              <a:rPr lang="en-US" dirty="0">
+                <a:latin typeface="Courier New" panose="02070309020205020404" pitchFamily="49" charset="0"/>
+                <a:cs typeface="Courier New" panose="02070309020205020404" pitchFamily="49" charset="0"/>
+              </a:rPr>
+              <a:t>, mean)</a:t>
+            </a:r>
+            <a:r>
+              <a:rPr lang="en-US" dirty="0"/>
+              <a:t> will give you the average </a:t>
+            </a:r>
+            <a:r>
+              <a:rPr lang="en-US" dirty="0" err="1"/>
+              <a:t>gpa</a:t>
+            </a:r>
+            <a:r>
+              <a:rPr lang="en-US" dirty="0"/>
+              <a:t> for each major!</a:t>
+            </a:r>
           </a:p>
         </p:txBody>
       </p:sp>
@@ -9566,7 +10005,7 @@
           <a:p>
             <a:fld id="{B08FEED8-D7D4-44E9-BFBC-ED06B5996D94}" type="datetime4">
               <a:rPr lang="en-US" smtClean="0"/>
-              <a:t>June 29, 2019</a:t>
+              <a:t>June 30, 2019</a:t>
             </a:fld>
             <a:endParaRPr lang="en-US" dirty="0"/>
           </a:p>
@@ -9649,7 +10088,7 @@
     </p:spTree>
     <p:extLst>
       <p:ext uri="{BB962C8B-B14F-4D97-AF65-F5344CB8AC3E}">
-        <p14:creationId xmlns:p14="http://schemas.microsoft.com/office/powerpoint/2010/main" val="3600469135"/>
+        <p14:creationId xmlns:p14="http://schemas.microsoft.com/office/powerpoint/2010/main" val="2319623369"/>
       </p:ext>
     </p:extLst>
   </p:cSld>
@@ -9884,7 +10323,29 @@
           <a:bodyPr/>
           <a:lstStyle/>
           <a:p>
-            <a:endParaRPr lang="en-US"/>
+            <a:r>
+              <a:rPr lang="en-US" dirty="0"/>
+              <a:t>Plot(</a:t>
+            </a:r>
+            <a:r>
+              <a:rPr lang="en-US" dirty="0" err="1"/>
+              <a:t>x_axis</a:t>
+            </a:r>
+            <a:r>
+              <a:rPr lang="en-US" dirty="0"/>
+              <a:t>, </a:t>
+            </a:r>
+            <a:r>
+              <a:rPr lang="en-US" dirty="0" err="1"/>
+              <a:t>y_axis</a:t>
+            </a:r>
+            <a:r>
+              <a:rPr lang="en-US" dirty="0"/>
+              <a:t>)</a:t>
+            </a:r>
+          </a:p>
+          <a:p>
+            <a:endParaRPr lang="en-US" dirty="0"/>
           </a:p>
         </p:txBody>
       </p:sp>
@@ -10052,7 +10513,10 @@
           <a:bodyPr/>
           <a:lstStyle/>
           <a:p>
-            <a:endParaRPr lang="en-US"/>
+            <a:r>
+              <a:rPr lang="en-US" dirty="0"/>
+              <a:t>Hist(rows, columns)</a:t>
+            </a:r>
           </a:p>
         </p:txBody>
       </p:sp>
@@ -10220,7 +10684,10 @@
           <a:bodyPr/>
           <a:lstStyle/>
           <a:p>
-            <a:endParaRPr lang="en-US"/>
+            <a:r>
+              <a:rPr lang="en-US" dirty="0"/>
+              <a:t>Boxplot(data)</a:t>
+            </a:r>
           </a:p>
         </p:txBody>
       </p:sp>
@@ -10589,7 +11056,14 @@
           <a:bodyPr/>
           <a:lstStyle/>
           <a:p>
-            <a:endParaRPr lang="en-US"/>
+            <a:r>
+              <a:rPr lang="en-US" dirty="0" err="1"/>
+              <a:t>Lm</a:t>
+            </a:r>
+            <a:r>
+              <a:rPr lang="en-US" dirty="0"/>
+              <a:t>()</a:t>
+            </a:r>
           </a:p>
         </p:txBody>
       </p:sp>
@@ -11007,7 +11481,22 @@
           <a:bodyPr/>
           <a:lstStyle/>
           <a:p>
-            <a:endParaRPr lang="en-US"/>
+            <a:r>
+              <a:rPr lang="en-US" dirty="0" err="1"/>
+              <a:t>Abline</a:t>
+            </a:r>
+            <a:r>
+              <a:rPr lang="en-US" dirty="0"/>
+              <a:t>(</a:t>
+            </a:r>
+            <a:r>
+              <a:rPr lang="en-US" err="1"/>
+              <a:t>lm</a:t>
+            </a:r>
+            <a:r>
+              <a:rPr lang="en-US"/>
+              <a:t>$coeff)</a:t>
+            </a:r>
           </a:p>
         </p:txBody>
       </p:sp>
@@ -12084,37 +12573,111 @@
           <a:p>
             <a:r>
               <a:rPr lang="en-US" dirty="0"/>
-              <a:t>Addition: + (5 + 3)</a:t>
-            </a:r>
-          </a:p>
-          <a:p>
-            <a:r>
-              <a:rPr lang="en-US" dirty="0"/>
-              <a:t>Subtraction: - (5 - 3). Also, negation with – (-3)</a:t>
-            </a:r>
-          </a:p>
-          <a:p>
-            <a:r>
-              <a:rPr lang="en-US" dirty="0"/>
-              <a:t>Multiplication: * (5 * 3)</a:t>
-            </a:r>
-          </a:p>
-          <a:p>
-            <a:r>
-              <a:rPr lang="en-US" dirty="0"/>
-              <a:t>Division: / (5 / 3)</a:t>
-            </a:r>
-          </a:p>
-          <a:p>
-            <a:r>
-              <a:rPr lang="en-US" dirty="0"/>
-              <a:t>Power: ** or ^ (5**3, 5^3)</a:t>
-            </a:r>
-          </a:p>
-          <a:p>
-            <a:r>
-              <a:rPr lang="en-US" dirty="0"/>
-              <a:t>Square Root: sqrt function (sqrt(5))</a:t>
+              <a:t>Addition: </a:t>
+            </a:r>
+            <a:r>
+              <a:rPr lang="en-US" dirty="0">
+                <a:latin typeface="Courier New" panose="02070309020205020404" pitchFamily="49" charset="0"/>
+                <a:cs typeface="Courier New" panose="02070309020205020404" pitchFamily="49" charset="0"/>
+              </a:rPr>
+              <a:t>+ (5 + 3)</a:t>
+            </a:r>
+          </a:p>
+          <a:p>
+            <a:r>
+              <a:rPr lang="en-US" dirty="0"/>
+              <a:t>Subtraction: </a:t>
+            </a:r>
+            <a:r>
+              <a:rPr lang="en-US" dirty="0">
+                <a:latin typeface="Courier New" panose="02070309020205020404" pitchFamily="49" charset="0"/>
+                <a:cs typeface="Courier New" panose="02070309020205020404" pitchFamily="49" charset="0"/>
+              </a:rPr>
+              <a:t>- (5 - 3). </a:t>
+            </a:r>
+            <a:r>
+              <a:rPr lang="en-US" dirty="0"/>
+              <a:t>Also, negation with </a:t>
+            </a:r>
+            <a:r>
+              <a:rPr lang="en-US" dirty="0">
+                <a:latin typeface="Courier New" panose="02070309020205020404" pitchFamily="49" charset="0"/>
+                <a:cs typeface="Courier New" panose="02070309020205020404" pitchFamily="49" charset="0"/>
+              </a:rPr>
+              <a:t>- (-3)</a:t>
+            </a:r>
+          </a:p>
+          <a:p>
+            <a:r>
+              <a:rPr lang="en-US" dirty="0"/>
+              <a:t>Multiplication: </a:t>
+            </a:r>
+            <a:r>
+              <a:rPr lang="en-US" dirty="0">
+                <a:latin typeface="Courier New" panose="02070309020205020404" pitchFamily="49" charset="0"/>
+                <a:cs typeface="Courier New" panose="02070309020205020404" pitchFamily="49" charset="0"/>
+              </a:rPr>
+              <a:t>* (5 * 3)</a:t>
+            </a:r>
+          </a:p>
+          <a:p>
+            <a:r>
+              <a:rPr lang="en-US" dirty="0"/>
+              <a:t>Division: </a:t>
+            </a:r>
+            <a:r>
+              <a:rPr lang="en-US" dirty="0">
+                <a:latin typeface="Courier New" panose="02070309020205020404" pitchFamily="49" charset="0"/>
+                <a:cs typeface="Courier New" panose="02070309020205020404" pitchFamily="49" charset="0"/>
+              </a:rPr>
+              <a:t>/ (5 / 3)</a:t>
+            </a:r>
+          </a:p>
+          <a:p>
+            <a:r>
+              <a:rPr lang="en-US" dirty="0"/>
+              <a:t>Power: </a:t>
+            </a:r>
+            <a:r>
+              <a:rPr lang="en-US" dirty="0">
+                <a:latin typeface="Courier New" panose="02070309020205020404" pitchFamily="49" charset="0"/>
+                <a:cs typeface="Courier New" panose="02070309020205020404" pitchFamily="49" charset="0"/>
+              </a:rPr>
+              <a:t>**</a:t>
+            </a:r>
+            <a:r>
+              <a:rPr lang="en-US" dirty="0"/>
+              <a:t> or </a:t>
+            </a:r>
+            <a:r>
+              <a:rPr lang="en-US" dirty="0">
+                <a:latin typeface="Courier New" panose="02070309020205020404" pitchFamily="49" charset="0"/>
+                <a:cs typeface="Courier New" panose="02070309020205020404" pitchFamily="49" charset="0"/>
+              </a:rPr>
+              <a:t>^ (5**3, 5^3)</a:t>
+            </a:r>
+          </a:p>
+          <a:p>
+            <a:r>
+              <a:rPr lang="en-US" dirty="0"/>
+              <a:t>Square Root: </a:t>
+            </a:r>
+            <a:r>
+              <a:rPr lang="en-US" dirty="0">
+                <a:latin typeface="Courier New" panose="02070309020205020404" pitchFamily="49" charset="0"/>
+                <a:cs typeface="Courier New" panose="02070309020205020404" pitchFamily="49" charset="0"/>
+              </a:rPr>
+              <a:t>sqrt</a:t>
+            </a:r>
+            <a:r>
+              <a:rPr lang="en-US" dirty="0"/>
+              <a:t> function </a:t>
+            </a:r>
+            <a:r>
+              <a:rPr lang="en-US" dirty="0">
+                <a:cs typeface="Courier New" panose="02070309020205020404" pitchFamily="49" charset="0"/>
+              </a:rPr>
+              <a:t>(sqrt(5))</a:t>
             </a:r>
           </a:p>
         </p:txBody>
@@ -12136,7 +12699,7 @@
           <a:p>
             <a:fld id="{B08FEED8-D7D4-44E9-BFBC-ED06B5996D94}" type="datetime4">
               <a:rPr lang="en-US" smtClean="0"/>
-              <a:t>June 29, 2019</a:t>
+              <a:t>June 30, 2019</a:t>
             </a:fld>
             <a:endParaRPr lang="en-US" dirty="0"/>
           </a:p>

</xml_diff>